<commit_message>
Add final version of final presentation
</commit_message>
<xml_diff>
--- a/documents/finalpresentation/GDP Group 18 pres.pptx
+++ b/documents/finalpresentation/GDP Group 18 pres.pptx
@@ -273,7 +273,7 @@
               <a:pPr>
                 <a:defRPr/>
               </a:pPr>
-              <a:t>10/01/2012</a:t>
+              <a:t>11/01/2012</a:t>
             </a:fld>
             <a:endParaRPr lang="en-GB"/>
           </a:p>
@@ -451,7 +451,7 @@
     </p:spTree>
     <p:extLst>
       <p:ext uri="{BB962C8B-B14F-4D97-AF65-F5344CB8AC3E}">
-        <p14:creationId xmlns:p14="http://schemas.microsoft.com/office/powerpoint/2010/main" val="2951307494"/>
+        <p14:creationId xmlns:p14="http://schemas.microsoft.com/office/powerpoint/2010/main" xmlns="" val="2951307494"/>
       </p:ext>
     </p:extLst>
   </p:cSld>
@@ -620,7 +620,7 @@
           </a:ln>
           <a:extLst>
             <a:ext uri="{909E8E84-426E-40DD-AFC4-6F175D3DCCD1}">
-              <a14:hiddenFill xmlns:a14="http://schemas.microsoft.com/office/drawing/2010/main">
+              <a14:hiddenFill xmlns:a14="http://schemas.microsoft.com/office/drawing/2010/main" xmlns="">
                 <a:solidFill>
                   <a:srgbClr val="FFFFFF"/>
                 </a:solidFill>
@@ -680,14 +680,14 @@
           <a:noFill/>
           <a:extLst>
             <a:ext uri="{909E8E84-426E-40DD-AFC4-6F175D3DCCD1}">
-              <a14:hiddenFill xmlns:a14="http://schemas.microsoft.com/office/drawing/2010/main">
+              <a14:hiddenFill xmlns:a14="http://schemas.microsoft.com/office/drawing/2010/main" xmlns="">
                 <a:solidFill>
                   <a:srgbClr val="FFFFFF"/>
                 </a:solidFill>
               </a14:hiddenFill>
             </a:ext>
             <a:ext uri="{91240B29-F687-4F45-9708-019B960494DF}">
-              <a14:hiddenLine xmlns:a14="http://schemas.microsoft.com/office/drawing/2010/main" w="9525">
+              <a14:hiddenLine xmlns:a14="http://schemas.microsoft.com/office/drawing/2010/main" xmlns="" w="9525">
                 <a:solidFill>
                   <a:srgbClr val="000000"/>
                 </a:solidFill>
@@ -869,7 +869,7 @@
           </a:ln>
           <a:extLst>
             <a:ext uri="{909E8E84-426E-40DD-AFC4-6F175D3DCCD1}">
-              <a14:hiddenFill xmlns:a14="http://schemas.microsoft.com/office/drawing/2010/main">
+              <a14:hiddenFill xmlns:a14="http://schemas.microsoft.com/office/drawing/2010/main" xmlns="">
                 <a:solidFill>
                   <a:srgbClr val="FFFFFF"/>
                 </a:solidFill>
@@ -892,14 +892,14 @@
           <a:noFill/>
           <a:extLst>
             <a:ext uri="{909E8E84-426E-40DD-AFC4-6F175D3DCCD1}">
-              <a14:hiddenFill xmlns:a14="http://schemas.microsoft.com/office/drawing/2010/main">
+              <a14:hiddenFill xmlns:a14="http://schemas.microsoft.com/office/drawing/2010/main" xmlns="">
                 <a:solidFill>
                   <a:srgbClr val="FFFFFF"/>
                 </a:solidFill>
               </a14:hiddenFill>
             </a:ext>
             <a:ext uri="{91240B29-F687-4F45-9708-019B960494DF}">
-              <a14:hiddenLine xmlns:a14="http://schemas.microsoft.com/office/drawing/2010/main" w="9525">
+              <a14:hiddenLine xmlns:a14="http://schemas.microsoft.com/office/drawing/2010/main" xmlns="" w="9525">
                 <a:solidFill>
                   <a:srgbClr val="000000"/>
                 </a:solidFill>
@@ -940,14 +940,14 @@
           <a:noFill/>
           <a:extLst>
             <a:ext uri="{909E8E84-426E-40DD-AFC4-6F175D3DCCD1}">
-              <a14:hiddenFill xmlns:a14="http://schemas.microsoft.com/office/drawing/2010/main">
+              <a14:hiddenFill xmlns:a14="http://schemas.microsoft.com/office/drawing/2010/main" xmlns="">
                 <a:solidFill>
                   <a:srgbClr val="FFFFFF"/>
                 </a:solidFill>
               </a14:hiddenFill>
             </a:ext>
             <a:ext uri="{91240B29-F687-4F45-9708-019B960494DF}">
-              <a14:hiddenLine xmlns:a14="http://schemas.microsoft.com/office/drawing/2010/main" w="9525">
+              <a14:hiddenLine xmlns:a14="http://schemas.microsoft.com/office/drawing/2010/main" xmlns="" w="9525">
                 <a:solidFill>
                   <a:srgbClr val="000000"/>
                 </a:solidFill>
@@ -1129,7 +1129,7 @@
           </a:ln>
           <a:extLst>
             <a:ext uri="{909E8E84-426E-40DD-AFC4-6F175D3DCCD1}">
-              <a14:hiddenFill xmlns:a14="http://schemas.microsoft.com/office/drawing/2010/main">
+              <a14:hiddenFill xmlns:a14="http://schemas.microsoft.com/office/drawing/2010/main" xmlns="">
                 <a:solidFill>
                   <a:srgbClr val="FFFFFF"/>
                 </a:solidFill>
@@ -1152,14 +1152,14 @@
           <a:noFill/>
           <a:extLst>
             <a:ext uri="{909E8E84-426E-40DD-AFC4-6F175D3DCCD1}">
-              <a14:hiddenFill xmlns:a14="http://schemas.microsoft.com/office/drawing/2010/main">
+              <a14:hiddenFill xmlns:a14="http://schemas.microsoft.com/office/drawing/2010/main" xmlns="">
                 <a:solidFill>
                   <a:srgbClr val="FFFFFF"/>
                 </a:solidFill>
               </a14:hiddenFill>
             </a:ext>
             <a:ext uri="{91240B29-F687-4F45-9708-019B960494DF}">
-              <a14:hiddenLine xmlns:a14="http://schemas.microsoft.com/office/drawing/2010/main" w="9525">
+              <a14:hiddenLine xmlns:a14="http://schemas.microsoft.com/office/drawing/2010/main" xmlns="" w="9525">
                 <a:solidFill>
                   <a:srgbClr val="000000"/>
                 </a:solidFill>
@@ -1200,14 +1200,14 @@
           <a:noFill/>
           <a:extLst>
             <a:ext uri="{909E8E84-426E-40DD-AFC4-6F175D3DCCD1}">
-              <a14:hiddenFill xmlns:a14="http://schemas.microsoft.com/office/drawing/2010/main">
+              <a14:hiddenFill xmlns:a14="http://schemas.microsoft.com/office/drawing/2010/main" xmlns="">
                 <a:solidFill>
                   <a:srgbClr val="FFFFFF"/>
                 </a:solidFill>
               </a14:hiddenFill>
             </a:ext>
             <a:ext uri="{91240B29-F687-4F45-9708-019B960494DF}">
-              <a14:hiddenLine xmlns:a14="http://schemas.microsoft.com/office/drawing/2010/main" w="9525">
+              <a14:hiddenLine xmlns:a14="http://schemas.microsoft.com/office/drawing/2010/main" xmlns="" w="9525">
                 <a:solidFill>
                   <a:srgbClr val="000000"/>
                 </a:solidFill>
@@ -1389,7 +1389,7 @@
           </a:ln>
           <a:extLst>
             <a:ext uri="{909E8E84-426E-40DD-AFC4-6F175D3DCCD1}">
-              <a14:hiddenFill xmlns:a14="http://schemas.microsoft.com/office/drawing/2010/main">
+              <a14:hiddenFill xmlns:a14="http://schemas.microsoft.com/office/drawing/2010/main" xmlns="">
                 <a:solidFill>
                   <a:srgbClr val="FFFFFF"/>
                 </a:solidFill>
@@ -1412,14 +1412,14 @@
           <a:noFill/>
           <a:extLst>
             <a:ext uri="{909E8E84-426E-40DD-AFC4-6F175D3DCCD1}">
-              <a14:hiddenFill xmlns:a14="http://schemas.microsoft.com/office/drawing/2010/main">
+              <a14:hiddenFill xmlns:a14="http://schemas.microsoft.com/office/drawing/2010/main" xmlns="">
                 <a:solidFill>
                   <a:srgbClr val="FFFFFF"/>
                 </a:solidFill>
               </a14:hiddenFill>
             </a:ext>
             <a:ext uri="{91240B29-F687-4F45-9708-019B960494DF}">
-              <a14:hiddenLine xmlns:a14="http://schemas.microsoft.com/office/drawing/2010/main" w="9525">
+              <a14:hiddenLine xmlns:a14="http://schemas.microsoft.com/office/drawing/2010/main" xmlns="" w="9525">
                 <a:solidFill>
                   <a:srgbClr val="000000"/>
                 </a:solidFill>
@@ -1460,14 +1460,14 @@
           <a:noFill/>
           <a:extLst>
             <a:ext uri="{909E8E84-426E-40DD-AFC4-6F175D3DCCD1}">
-              <a14:hiddenFill xmlns:a14="http://schemas.microsoft.com/office/drawing/2010/main">
+              <a14:hiddenFill xmlns:a14="http://schemas.microsoft.com/office/drawing/2010/main" xmlns="">
                 <a:solidFill>
                   <a:srgbClr val="FFFFFF"/>
                 </a:solidFill>
               </a14:hiddenFill>
             </a:ext>
             <a:ext uri="{91240B29-F687-4F45-9708-019B960494DF}">
-              <a14:hiddenLine xmlns:a14="http://schemas.microsoft.com/office/drawing/2010/main" w="9525">
+              <a14:hiddenLine xmlns:a14="http://schemas.microsoft.com/office/drawing/2010/main" xmlns="" w="9525">
                 <a:solidFill>
                   <a:srgbClr val="000000"/>
                 </a:solidFill>
@@ -1649,7 +1649,7 @@
           </a:ln>
           <a:extLst>
             <a:ext uri="{909E8E84-426E-40DD-AFC4-6F175D3DCCD1}">
-              <a14:hiddenFill xmlns:a14="http://schemas.microsoft.com/office/drawing/2010/main">
+              <a14:hiddenFill xmlns:a14="http://schemas.microsoft.com/office/drawing/2010/main" xmlns="">
                 <a:solidFill>
                   <a:srgbClr val="FFFFFF"/>
                 </a:solidFill>
@@ -1672,14 +1672,14 @@
           <a:noFill/>
           <a:extLst>
             <a:ext uri="{909E8E84-426E-40DD-AFC4-6F175D3DCCD1}">
-              <a14:hiddenFill xmlns:a14="http://schemas.microsoft.com/office/drawing/2010/main">
+              <a14:hiddenFill xmlns:a14="http://schemas.microsoft.com/office/drawing/2010/main" xmlns="">
                 <a:solidFill>
                   <a:srgbClr val="FFFFFF"/>
                 </a:solidFill>
               </a14:hiddenFill>
             </a:ext>
             <a:ext uri="{91240B29-F687-4F45-9708-019B960494DF}">
-              <a14:hiddenLine xmlns:a14="http://schemas.microsoft.com/office/drawing/2010/main" w="9525">
+              <a14:hiddenLine xmlns:a14="http://schemas.microsoft.com/office/drawing/2010/main" xmlns="" w="9525">
                 <a:solidFill>
                   <a:srgbClr val="000000"/>
                 </a:solidFill>
@@ -1720,14 +1720,14 @@
           <a:noFill/>
           <a:extLst>
             <a:ext uri="{909E8E84-426E-40DD-AFC4-6F175D3DCCD1}">
-              <a14:hiddenFill xmlns:a14="http://schemas.microsoft.com/office/drawing/2010/main">
+              <a14:hiddenFill xmlns:a14="http://schemas.microsoft.com/office/drawing/2010/main" xmlns="">
                 <a:solidFill>
                   <a:srgbClr val="FFFFFF"/>
                 </a:solidFill>
               </a14:hiddenFill>
             </a:ext>
             <a:ext uri="{91240B29-F687-4F45-9708-019B960494DF}">
-              <a14:hiddenLine xmlns:a14="http://schemas.microsoft.com/office/drawing/2010/main" w="9525">
+              <a14:hiddenLine xmlns:a14="http://schemas.microsoft.com/office/drawing/2010/main" xmlns="" w="9525">
                 <a:solidFill>
                   <a:srgbClr val="000000"/>
                 </a:solidFill>
@@ -1909,7 +1909,7 @@
           </a:ln>
           <a:extLst>
             <a:ext uri="{909E8E84-426E-40DD-AFC4-6F175D3DCCD1}">
-              <a14:hiddenFill xmlns:a14="http://schemas.microsoft.com/office/drawing/2010/main">
+              <a14:hiddenFill xmlns:a14="http://schemas.microsoft.com/office/drawing/2010/main" xmlns="">
                 <a:solidFill>
                   <a:srgbClr val="FFFFFF"/>
                 </a:solidFill>
@@ -1932,14 +1932,14 @@
           <a:noFill/>
           <a:extLst>
             <a:ext uri="{909E8E84-426E-40DD-AFC4-6F175D3DCCD1}">
-              <a14:hiddenFill xmlns:a14="http://schemas.microsoft.com/office/drawing/2010/main">
+              <a14:hiddenFill xmlns:a14="http://schemas.microsoft.com/office/drawing/2010/main" xmlns="">
                 <a:solidFill>
                   <a:srgbClr val="FFFFFF"/>
                 </a:solidFill>
               </a14:hiddenFill>
             </a:ext>
             <a:ext uri="{91240B29-F687-4F45-9708-019B960494DF}">
-              <a14:hiddenLine xmlns:a14="http://schemas.microsoft.com/office/drawing/2010/main" w="9525">
+              <a14:hiddenLine xmlns:a14="http://schemas.microsoft.com/office/drawing/2010/main" xmlns="" w="9525">
                 <a:solidFill>
                   <a:srgbClr val="000000"/>
                 </a:solidFill>
@@ -1980,14 +1980,14 @@
           <a:noFill/>
           <a:extLst>
             <a:ext uri="{909E8E84-426E-40DD-AFC4-6F175D3DCCD1}">
-              <a14:hiddenFill xmlns:a14="http://schemas.microsoft.com/office/drawing/2010/main">
+              <a14:hiddenFill xmlns:a14="http://schemas.microsoft.com/office/drawing/2010/main" xmlns="">
                 <a:solidFill>
                   <a:srgbClr val="FFFFFF"/>
                 </a:solidFill>
               </a14:hiddenFill>
             </a:ext>
             <a:ext uri="{91240B29-F687-4F45-9708-019B960494DF}">
-              <a14:hiddenLine xmlns:a14="http://schemas.microsoft.com/office/drawing/2010/main" w="9525">
+              <a14:hiddenLine xmlns:a14="http://schemas.microsoft.com/office/drawing/2010/main" xmlns="" w="9525">
                 <a:solidFill>
                   <a:srgbClr val="000000"/>
                 </a:solidFill>
@@ -2169,7 +2169,7 @@
           </a:ln>
           <a:extLst>
             <a:ext uri="{909E8E84-426E-40DD-AFC4-6F175D3DCCD1}">
-              <a14:hiddenFill xmlns:a14="http://schemas.microsoft.com/office/drawing/2010/main">
+              <a14:hiddenFill xmlns:a14="http://schemas.microsoft.com/office/drawing/2010/main" xmlns="">
                 <a:solidFill>
                   <a:srgbClr val="FFFFFF"/>
                 </a:solidFill>
@@ -2192,14 +2192,14 @@
           <a:noFill/>
           <a:extLst>
             <a:ext uri="{909E8E84-426E-40DD-AFC4-6F175D3DCCD1}">
-              <a14:hiddenFill xmlns:a14="http://schemas.microsoft.com/office/drawing/2010/main">
+              <a14:hiddenFill xmlns:a14="http://schemas.microsoft.com/office/drawing/2010/main" xmlns="">
                 <a:solidFill>
                   <a:srgbClr val="FFFFFF"/>
                 </a:solidFill>
               </a14:hiddenFill>
             </a:ext>
             <a:ext uri="{91240B29-F687-4F45-9708-019B960494DF}">
-              <a14:hiddenLine xmlns:a14="http://schemas.microsoft.com/office/drawing/2010/main" w="9525">
+              <a14:hiddenLine xmlns:a14="http://schemas.microsoft.com/office/drawing/2010/main" xmlns="" w="9525">
                 <a:solidFill>
                   <a:srgbClr val="000000"/>
                 </a:solidFill>
@@ -2240,14 +2240,14 @@
           <a:noFill/>
           <a:extLst>
             <a:ext uri="{909E8E84-426E-40DD-AFC4-6F175D3DCCD1}">
-              <a14:hiddenFill xmlns:a14="http://schemas.microsoft.com/office/drawing/2010/main">
+              <a14:hiddenFill xmlns:a14="http://schemas.microsoft.com/office/drawing/2010/main" xmlns="">
                 <a:solidFill>
                   <a:srgbClr val="FFFFFF"/>
                 </a:solidFill>
               </a14:hiddenFill>
             </a:ext>
             <a:ext uri="{91240B29-F687-4F45-9708-019B960494DF}">
-              <a14:hiddenLine xmlns:a14="http://schemas.microsoft.com/office/drawing/2010/main" w="9525">
+              <a14:hiddenLine xmlns:a14="http://schemas.microsoft.com/office/drawing/2010/main" xmlns="" w="9525">
                 <a:solidFill>
                   <a:srgbClr val="000000"/>
                 </a:solidFill>
@@ -2470,7 +2470,7 @@
     </p:spTree>
     <p:extLst>
       <p:ext uri="{BB962C8B-B14F-4D97-AF65-F5344CB8AC3E}">
-        <p14:creationId xmlns:p14="http://schemas.microsoft.com/office/powerpoint/2010/main" val="2406271153"/>
+        <p14:creationId xmlns:p14="http://schemas.microsoft.com/office/powerpoint/2010/main" xmlns="" val="2406271153"/>
       </p:ext>
     </p:extLst>
   </p:cSld>
@@ -2519,7 +2519,7 @@
           </a:ln>
           <a:extLst>
             <a:ext uri="{909E8E84-426E-40DD-AFC4-6F175D3DCCD1}">
-              <a14:hiddenFill xmlns:a14="http://schemas.microsoft.com/office/drawing/2010/main">
+              <a14:hiddenFill xmlns:a14="http://schemas.microsoft.com/office/drawing/2010/main" xmlns="">
                 <a:solidFill>
                   <a:srgbClr val="FFFFFF"/>
                 </a:solidFill>
@@ -2542,14 +2542,14 @@
           <a:noFill/>
           <a:extLst>
             <a:ext uri="{909E8E84-426E-40DD-AFC4-6F175D3DCCD1}">
-              <a14:hiddenFill xmlns:a14="http://schemas.microsoft.com/office/drawing/2010/main">
+              <a14:hiddenFill xmlns:a14="http://schemas.microsoft.com/office/drawing/2010/main" xmlns="">
                 <a:solidFill>
                   <a:srgbClr val="FFFFFF"/>
                 </a:solidFill>
               </a14:hiddenFill>
             </a:ext>
             <a:ext uri="{91240B29-F687-4F45-9708-019B960494DF}">
-              <a14:hiddenLine xmlns:a14="http://schemas.microsoft.com/office/drawing/2010/main" w="9525">
+              <a14:hiddenLine xmlns:a14="http://schemas.microsoft.com/office/drawing/2010/main" xmlns="" w="9525">
                 <a:solidFill>
                   <a:srgbClr val="000000"/>
                 </a:solidFill>
@@ -2586,14 +2586,14 @@
           <a:noFill/>
           <a:extLst>
             <a:ext uri="{909E8E84-426E-40DD-AFC4-6F175D3DCCD1}">
-              <a14:hiddenFill xmlns:a14="http://schemas.microsoft.com/office/drawing/2010/main">
+              <a14:hiddenFill xmlns:a14="http://schemas.microsoft.com/office/drawing/2010/main" xmlns="">
                 <a:solidFill>
                   <a:srgbClr val="FFFFFF"/>
                 </a:solidFill>
               </a14:hiddenFill>
             </a:ext>
             <a:ext uri="{91240B29-F687-4F45-9708-019B960494DF}">
-              <a14:hiddenLine xmlns:a14="http://schemas.microsoft.com/office/drawing/2010/main" w="9525">
+              <a14:hiddenLine xmlns:a14="http://schemas.microsoft.com/office/drawing/2010/main" xmlns="" w="9525">
                 <a:solidFill>
                   <a:srgbClr val="000000"/>
                 </a:solidFill>
@@ -2775,7 +2775,7 @@
           </a:ln>
           <a:extLst>
             <a:ext uri="{909E8E84-426E-40DD-AFC4-6F175D3DCCD1}">
-              <a14:hiddenFill xmlns:a14="http://schemas.microsoft.com/office/drawing/2010/main">
+              <a14:hiddenFill xmlns:a14="http://schemas.microsoft.com/office/drawing/2010/main" xmlns="">
                 <a:solidFill>
                   <a:srgbClr val="FFFFFF"/>
                 </a:solidFill>
@@ -2880,14 +2880,14 @@
           <a:noFill/>
           <a:extLst>
             <a:ext uri="{909E8E84-426E-40DD-AFC4-6F175D3DCCD1}">
-              <a14:hiddenFill xmlns:a14="http://schemas.microsoft.com/office/drawing/2010/main">
+              <a14:hiddenFill xmlns:a14="http://schemas.microsoft.com/office/drawing/2010/main" xmlns="">
                 <a:solidFill>
                   <a:srgbClr val="FFFFFF"/>
                 </a:solidFill>
               </a14:hiddenFill>
             </a:ext>
             <a:ext uri="{91240B29-F687-4F45-9708-019B960494DF}">
-              <a14:hiddenLine xmlns:a14="http://schemas.microsoft.com/office/drawing/2010/main" w="9525">
+              <a14:hiddenLine xmlns:a14="http://schemas.microsoft.com/office/drawing/2010/main" xmlns="" w="9525">
                 <a:solidFill>
                   <a:srgbClr val="000000"/>
                 </a:solidFill>
@@ -3069,7 +3069,7 @@
           </a:ln>
           <a:extLst>
             <a:ext uri="{909E8E84-426E-40DD-AFC4-6F175D3DCCD1}">
-              <a14:hiddenFill xmlns:a14="http://schemas.microsoft.com/office/drawing/2010/main">
+              <a14:hiddenFill xmlns:a14="http://schemas.microsoft.com/office/drawing/2010/main" xmlns="">
                 <a:solidFill>
                   <a:srgbClr val="FFFFFF"/>
                 </a:solidFill>
@@ -3092,14 +3092,14 @@
           <a:noFill/>
           <a:extLst>
             <a:ext uri="{909E8E84-426E-40DD-AFC4-6F175D3DCCD1}">
-              <a14:hiddenFill xmlns:a14="http://schemas.microsoft.com/office/drawing/2010/main">
+              <a14:hiddenFill xmlns:a14="http://schemas.microsoft.com/office/drawing/2010/main" xmlns="">
                 <a:solidFill>
                   <a:srgbClr val="FFFFFF"/>
                 </a:solidFill>
               </a14:hiddenFill>
             </a:ext>
             <a:ext uri="{91240B29-F687-4F45-9708-019B960494DF}">
-              <a14:hiddenLine xmlns:a14="http://schemas.microsoft.com/office/drawing/2010/main" w="9525">
+              <a14:hiddenLine xmlns:a14="http://schemas.microsoft.com/office/drawing/2010/main" xmlns="" w="9525">
                 <a:solidFill>
                   <a:srgbClr val="000000"/>
                 </a:solidFill>
@@ -3140,14 +3140,14 @@
           <a:noFill/>
           <a:extLst>
             <a:ext uri="{909E8E84-426E-40DD-AFC4-6F175D3DCCD1}">
-              <a14:hiddenFill xmlns:a14="http://schemas.microsoft.com/office/drawing/2010/main">
+              <a14:hiddenFill xmlns:a14="http://schemas.microsoft.com/office/drawing/2010/main" xmlns="">
                 <a:solidFill>
                   <a:srgbClr val="FFFFFF"/>
                 </a:solidFill>
               </a14:hiddenFill>
             </a:ext>
             <a:ext uri="{91240B29-F687-4F45-9708-019B960494DF}">
-              <a14:hiddenLine xmlns:a14="http://schemas.microsoft.com/office/drawing/2010/main" w="9525">
+              <a14:hiddenLine xmlns:a14="http://schemas.microsoft.com/office/drawing/2010/main" xmlns="" w="9525">
                 <a:solidFill>
                   <a:srgbClr val="000000"/>
                 </a:solidFill>
@@ -3329,7 +3329,7 @@
           </a:ln>
           <a:extLst>
             <a:ext uri="{909E8E84-426E-40DD-AFC4-6F175D3DCCD1}">
-              <a14:hiddenFill xmlns:a14="http://schemas.microsoft.com/office/drawing/2010/main">
+              <a14:hiddenFill xmlns:a14="http://schemas.microsoft.com/office/drawing/2010/main" xmlns="">
                 <a:solidFill>
                   <a:srgbClr val="FFFFFF"/>
                 </a:solidFill>
@@ -3352,14 +3352,14 @@
           <a:noFill/>
           <a:extLst>
             <a:ext uri="{909E8E84-426E-40DD-AFC4-6F175D3DCCD1}">
-              <a14:hiddenFill xmlns:a14="http://schemas.microsoft.com/office/drawing/2010/main">
+              <a14:hiddenFill xmlns:a14="http://schemas.microsoft.com/office/drawing/2010/main" xmlns="">
                 <a:solidFill>
                   <a:srgbClr val="FFFFFF"/>
                 </a:solidFill>
               </a14:hiddenFill>
             </a:ext>
             <a:ext uri="{91240B29-F687-4F45-9708-019B960494DF}">
-              <a14:hiddenLine xmlns:a14="http://schemas.microsoft.com/office/drawing/2010/main" w="9525">
+              <a14:hiddenLine xmlns:a14="http://schemas.microsoft.com/office/drawing/2010/main" xmlns="" w="9525">
                 <a:solidFill>
                   <a:srgbClr val="000000"/>
                 </a:solidFill>
@@ -3404,14 +3404,14 @@
           <a:noFill/>
           <a:extLst>
             <a:ext uri="{909E8E84-426E-40DD-AFC4-6F175D3DCCD1}">
-              <a14:hiddenFill xmlns:a14="http://schemas.microsoft.com/office/drawing/2010/main">
+              <a14:hiddenFill xmlns:a14="http://schemas.microsoft.com/office/drawing/2010/main" xmlns="">
                 <a:solidFill>
                   <a:srgbClr val="FFFFFF"/>
                 </a:solidFill>
               </a14:hiddenFill>
             </a:ext>
             <a:ext uri="{91240B29-F687-4F45-9708-019B960494DF}">
-              <a14:hiddenLine xmlns:a14="http://schemas.microsoft.com/office/drawing/2010/main" w="9525">
+              <a14:hiddenLine xmlns:a14="http://schemas.microsoft.com/office/drawing/2010/main" xmlns="" w="9525">
                 <a:solidFill>
                   <a:srgbClr val="000000"/>
                 </a:solidFill>
@@ -3593,7 +3593,7 @@
           </a:ln>
           <a:extLst>
             <a:ext uri="{909E8E84-426E-40DD-AFC4-6F175D3DCCD1}">
-              <a14:hiddenFill xmlns:a14="http://schemas.microsoft.com/office/drawing/2010/main">
+              <a14:hiddenFill xmlns:a14="http://schemas.microsoft.com/office/drawing/2010/main" xmlns="">
                 <a:solidFill>
                   <a:srgbClr val="FFFFFF"/>
                 </a:solidFill>
@@ -3616,14 +3616,14 @@
           <a:noFill/>
           <a:extLst>
             <a:ext uri="{909E8E84-426E-40DD-AFC4-6F175D3DCCD1}">
-              <a14:hiddenFill xmlns:a14="http://schemas.microsoft.com/office/drawing/2010/main">
+              <a14:hiddenFill xmlns:a14="http://schemas.microsoft.com/office/drawing/2010/main" xmlns="">
                 <a:solidFill>
                   <a:srgbClr val="FFFFFF"/>
                 </a:solidFill>
               </a14:hiddenFill>
             </a:ext>
             <a:ext uri="{91240B29-F687-4F45-9708-019B960494DF}">
-              <a14:hiddenLine xmlns:a14="http://schemas.microsoft.com/office/drawing/2010/main" w="9525">
+              <a14:hiddenLine xmlns:a14="http://schemas.microsoft.com/office/drawing/2010/main" xmlns="" w="9525">
                 <a:solidFill>
                   <a:srgbClr val="000000"/>
                 </a:solidFill>
@@ -3664,14 +3664,14 @@
           <a:noFill/>
           <a:extLst>
             <a:ext uri="{909E8E84-426E-40DD-AFC4-6F175D3DCCD1}">
-              <a14:hiddenFill xmlns:a14="http://schemas.microsoft.com/office/drawing/2010/main">
+              <a14:hiddenFill xmlns:a14="http://schemas.microsoft.com/office/drawing/2010/main" xmlns="">
                 <a:solidFill>
                   <a:srgbClr val="FFFFFF"/>
                 </a:solidFill>
               </a14:hiddenFill>
             </a:ext>
             <a:ext uri="{91240B29-F687-4F45-9708-019B960494DF}">
-              <a14:hiddenLine xmlns:a14="http://schemas.microsoft.com/office/drawing/2010/main" w="9525">
+              <a14:hiddenLine xmlns:a14="http://schemas.microsoft.com/office/drawing/2010/main" xmlns="" w="9525">
                 <a:solidFill>
                   <a:srgbClr val="000000"/>
                 </a:solidFill>
@@ -3853,7 +3853,7 @@
           </a:ln>
           <a:extLst>
             <a:ext uri="{909E8E84-426E-40DD-AFC4-6F175D3DCCD1}">
-              <a14:hiddenFill xmlns:a14="http://schemas.microsoft.com/office/drawing/2010/main">
+              <a14:hiddenFill xmlns:a14="http://schemas.microsoft.com/office/drawing/2010/main" xmlns="">
                 <a:solidFill>
                   <a:srgbClr val="FFFFFF"/>
                 </a:solidFill>
@@ -3876,14 +3876,14 @@
           <a:noFill/>
           <a:extLst>
             <a:ext uri="{909E8E84-426E-40DD-AFC4-6F175D3DCCD1}">
-              <a14:hiddenFill xmlns:a14="http://schemas.microsoft.com/office/drawing/2010/main">
+              <a14:hiddenFill xmlns:a14="http://schemas.microsoft.com/office/drawing/2010/main" xmlns="">
                 <a:solidFill>
                   <a:srgbClr val="FFFFFF"/>
                 </a:solidFill>
               </a14:hiddenFill>
             </a:ext>
             <a:ext uri="{91240B29-F687-4F45-9708-019B960494DF}">
-              <a14:hiddenLine xmlns:a14="http://schemas.microsoft.com/office/drawing/2010/main" w="9525">
+              <a14:hiddenLine xmlns:a14="http://schemas.microsoft.com/office/drawing/2010/main" xmlns="" w="9525">
                 <a:solidFill>
                   <a:srgbClr val="000000"/>
                 </a:solidFill>
@@ -3924,14 +3924,14 @@
           <a:noFill/>
           <a:extLst>
             <a:ext uri="{909E8E84-426E-40DD-AFC4-6F175D3DCCD1}">
-              <a14:hiddenFill xmlns:a14="http://schemas.microsoft.com/office/drawing/2010/main">
+              <a14:hiddenFill xmlns:a14="http://schemas.microsoft.com/office/drawing/2010/main" xmlns="">
                 <a:solidFill>
                   <a:srgbClr val="FFFFFF"/>
                 </a:solidFill>
               </a14:hiddenFill>
             </a:ext>
             <a:ext uri="{91240B29-F687-4F45-9708-019B960494DF}">
-              <a14:hiddenLine xmlns:a14="http://schemas.microsoft.com/office/drawing/2010/main" w="9525">
+              <a14:hiddenLine xmlns:a14="http://schemas.microsoft.com/office/drawing/2010/main" xmlns="" w="9525">
                 <a:solidFill>
                   <a:srgbClr val="000000"/>
                 </a:solidFill>
@@ -4113,7 +4113,7 @@
           </a:ln>
           <a:extLst>
             <a:ext uri="{909E8E84-426E-40DD-AFC4-6F175D3DCCD1}">
-              <a14:hiddenFill xmlns:a14="http://schemas.microsoft.com/office/drawing/2010/main">
+              <a14:hiddenFill xmlns:a14="http://schemas.microsoft.com/office/drawing/2010/main" xmlns="">
                 <a:solidFill>
                   <a:srgbClr val="FFFFFF"/>
                 </a:solidFill>
@@ -4136,14 +4136,14 @@
           <a:noFill/>
           <a:extLst>
             <a:ext uri="{909E8E84-426E-40DD-AFC4-6F175D3DCCD1}">
-              <a14:hiddenFill xmlns:a14="http://schemas.microsoft.com/office/drawing/2010/main">
+              <a14:hiddenFill xmlns:a14="http://schemas.microsoft.com/office/drawing/2010/main" xmlns="">
                 <a:solidFill>
                   <a:srgbClr val="FFFFFF"/>
                 </a:solidFill>
               </a14:hiddenFill>
             </a:ext>
             <a:ext uri="{91240B29-F687-4F45-9708-019B960494DF}">
-              <a14:hiddenLine xmlns:a14="http://schemas.microsoft.com/office/drawing/2010/main" w="9525">
+              <a14:hiddenLine xmlns:a14="http://schemas.microsoft.com/office/drawing/2010/main" xmlns="" w="9525">
                 <a:solidFill>
                   <a:srgbClr val="000000"/>
                 </a:solidFill>
@@ -4188,14 +4188,14 @@
           <a:noFill/>
           <a:extLst>
             <a:ext uri="{909E8E84-426E-40DD-AFC4-6F175D3DCCD1}">
-              <a14:hiddenFill xmlns:a14="http://schemas.microsoft.com/office/drawing/2010/main">
+              <a14:hiddenFill xmlns:a14="http://schemas.microsoft.com/office/drawing/2010/main" xmlns="">
                 <a:solidFill>
                   <a:srgbClr val="FFFFFF"/>
                 </a:solidFill>
               </a14:hiddenFill>
             </a:ext>
             <a:ext uri="{91240B29-F687-4F45-9708-019B960494DF}">
-              <a14:hiddenLine xmlns:a14="http://schemas.microsoft.com/office/drawing/2010/main" w="9525">
+              <a14:hiddenLine xmlns:a14="http://schemas.microsoft.com/office/drawing/2010/main" xmlns="" w="9525">
                 <a:solidFill>
                   <a:srgbClr val="000000"/>
                 </a:solidFill>
@@ -4377,7 +4377,7 @@
           </a:ln>
           <a:extLst>
             <a:ext uri="{909E8E84-426E-40DD-AFC4-6F175D3DCCD1}">
-              <a14:hiddenFill xmlns:a14="http://schemas.microsoft.com/office/drawing/2010/main">
+              <a14:hiddenFill xmlns:a14="http://schemas.microsoft.com/office/drawing/2010/main" xmlns="">
                 <a:solidFill>
                   <a:srgbClr val="FFFFFF"/>
                 </a:solidFill>
@@ -4400,14 +4400,14 @@
           <a:noFill/>
           <a:extLst>
             <a:ext uri="{909E8E84-426E-40DD-AFC4-6F175D3DCCD1}">
-              <a14:hiddenFill xmlns:a14="http://schemas.microsoft.com/office/drawing/2010/main">
+              <a14:hiddenFill xmlns:a14="http://schemas.microsoft.com/office/drawing/2010/main" xmlns="">
                 <a:solidFill>
                   <a:srgbClr val="FFFFFF"/>
                 </a:solidFill>
               </a14:hiddenFill>
             </a:ext>
             <a:ext uri="{91240B29-F687-4F45-9708-019B960494DF}">
-              <a14:hiddenLine xmlns:a14="http://schemas.microsoft.com/office/drawing/2010/main" w="9525">
+              <a14:hiddenLine xmlns:a14="http://schemas.microsoft.com/office/drawing/2010/main" xmlns="" w="9525">
                 <a:solidFill>
                   <a:srgbClr val="000000"/>
                 </a:solidFill>
@@ -4448,14 +4448,14 @@
           <a:noFill/>
           <a:extLst>
             <a:ext uri="{909E8E84-426E-40DD-AFC4-6F175D3DCCD1}">
-              <a14:hiddenFill xmlns:a14="http://schemas.microsoft.com/office/drawing/2010/main">
+              <a14:hiddenFill xmlns:a14="http://schemas.microsoft.com/office/drawing/2010/main" xmlns="">
                 <a:solidFill>
                   <a:srgbClr val="FFFFFF"/>
                 </a:solidFill>
               </a14:hiddenFill>
             </a:ext>
             <a:ext uri="{91240B29-F687-4F45-9708-019B960494DF}">
-              <a14:hiddenLine xmlns:a14="http://schemas.microsoft.com/office/drawing/2010/main" w="9525">
+              <a14:hiddenLine xmlns:a14="http://schemas.microsoft.com/office/drawing/2010/main" xmlns="" w="9525">
                 <a:solidFill>
                   <a:srgbClr val="000000"/>
                 </a:solidFill>
@@ -4637,7 +4637,7 @@
           </a:ln>
           <a:extLst>
             <a:ext uri="{909E8E84-426E-40DD-AFC4-6F175D3DCCD1}">
-              <a14:hiddenFill xmlns:a14="http://schemas.microsoft.com/office/drawing/2010/main">
+              <a14:hiddenFill xmlns:a14="http://schemas.microsoft.com/office/drawing/2010/main" xmlns="">
                 <a:solidFill>
                   <a:srgbClr val="FFFFFF"/>
                 </a:solidFill>
@@ -4660,14 +4660,14 @@
           <a:noFill/>
           <a:extLst>
             <a:ext uri="{909E8E84-426E-40DD-AFC4-6F175D3DCCD1}">
-              <a14:hiddenFill xmlns:a14="http://schemas.microsoft.com/office/drawing/2010/main">
+              <a14:hiddenFill xmlns:a14="http://schemas.microsoft.com/office/drawing/2010/main" xmlns="">
                 <a:solidFill>
                   <a:srgbClr val="FFFFFF"/>
                 </a:solidFill>
               </a14:hiddenFill>
             </a:ext>
             <a:ext uri="{91240B29-F687-4F45-9708-019B960494DF}">
-              <a14:hiddenLine xmlns:a14="http://schemas.microsoft.com/office/drawing/2010/main" w="9525">
+              <a14:hiddenLine xmlns:a14="http://schemas.microsoft.com/office/drawing/2010/main" xmlns="" w="9525">
                 <a:solidFill>
                   <a:srgbClr val="000000"/>
                 </a:solidFill>
@@ -4708,14 +4708,14 @@
           <a:noFill/>
           <a:extLst>
             <a:ext uri="{909E8E84-426E-40DD-AFC4-6F175D3DCCD1}">
-              <a14:hiddenFill xmlns:a14="http://schemas.microsoft.com/office/drawing/2010/main">
+              <a14:hiddenFill xmlns:a14="http://schemas.microsoft.com/office/drawing/2010/main" xmlns="">
                 <a:solidFill>
                   <a:srgbClr val="FFFFFF"/>
                 </a:solidFill>
               </a14:hiddenFill>
             </a:ext>
             <a:ext uri="{91240B29-F687-4F45-9708-019B960494DF}">
-              <a14:hiddenLine xmlns:a14="http://schemas.microsoft.com/office/drawing/2010/main" w="9525">
+              <a14:hiddenLine xmlns:a14="http://schemas.microsoft.com/office/drawing/2010/main" xmlns="" w="9525">
                 <a:solidFill>
                   <a:srgbClr val="000000"/>
                 </a:solidFill>
@@ -5049,7 +5049,7 @@
               <a:pPr>
                 <a:defRPr/>
               </a:pPr>
-              <a:t>10/01/2012</a:t>
+              <a:t>11/01/2012</a:t>
             </a:fld>
             <a:endParaRPr lang="en-GB"/>
           </a:p>
@@ -5117,7 +5117,7 @@
     </p:spTree>
     <p:extLst>
       <p:ext uri="{BB962C8B-B14F-4D97-AF65-F5344CB8AC3E}">
-        <p14:creationId xmlns:p14="http://schemas.microsoft.com/office/powerpoint/2010/main" val="379304065"/>
+        <p14:creationId xmlns:p14="http://schemas.microsoft.com/office/powerpoint/2010/main" xmlns="" val="379304065"/>
       </p:ext>
     </p:extLst>
   </p:cSld>
@@ -5246,7 +5246,7 @@
               <a:pPr>
                 <a:defRPr/>
               </a:pPr>
-              <a:t>10/01/2012</a:t>
+              <a:t>11/01/2012</a:t>
             </a:fld>
             <a:endParaRPr lang="en-GB"/>
           </a:p>
@@ -5314,7 +5314,7 @@
     </p:spTree>
     <p:extLst>
       <p:ext uri="{BB962C8B-B14F-4D97-AF65-F5344CB8AC3E}">
-        <p14:creationId xmlns:p14="http://schemas.microsoft.com/office/powerpoint/2010/main" val="738823105"/>
+        <p14:creationId xmlns:p14="http://schemas.microsoft.com/office/powerpoint/2010/main" xmlns="" val="738823105"/>
       </p:ext>
     </p:extLst>
   </p:cSld>
@@ -5453,7 +5453,7 @@
               <a:pPr>
                 <a:defRPr/>
               </a:pPr>
-              <a:t>10/01/2012</a:t>
+              <a:t>11/01/2012</a:t>
             </a:fld>
             <a:endParaRPr lang="en-GB"/>
           </a:p>
@@ -5521,7 +5521,7 @@
     </p:spTree>
     <p:extLst>
       <p:ext uri="{BB962C8B-B14F-4D97-AF65-F5344CB8AC3E}">
-        <p14:creationId xmlns:p14="http://schemas.microsoft.com/office/powerpoint/2010/main" val="905566408"/>
+        <p14:creationId xmlns:p14="http://schemas.microsoft.com/office/powerpoint/2010/main" xmlns="" val="905566408"/>
       </p:ext>
     </p:extLst>
   </p:cSld>
@@ -5650,7 +5650,7 @@
               <a:pPr>
                 <a:defRPr/>
               </a:pPr>
-              <a:t>10/01/2012</a:t>
+              <a:t>11/01/2012</a:t>
             </a:fld>
             <a:endParaRPr lang="en-GB"/>
           </a:p>
@@ -5718,7 +5718,7 @@
     </p:spTree>
     <p:extLst>
       <p:ext uri="{BB962C8B-B14F-4D97-AF65-F5344CB8AC3E}">
-        <p14:creationId xmlns:p14="http://schemas.microsoft.com/office/powerpoint/2010/main" val="2633826277"/>
+        <p14:creationId xmlns:p14="http://schemas.microsoft.com/office/powerpoint/2010/main" xmlns="" val="2633826277"/>
       </p:ext>
     </p:extLst>
   </p:cSld>
@@ -5923,7 +5923,7 @@
               <a:pPr>
                 <a:defRPr/>
               </a:pPr>
-              <a:t>10/01/2012</a:t>
+              <a:t>11/01/2012</a:t>
             </a:fld>
             <a:endParaRPr lang="en-GB"/>
           </a:p>
@@ -5991,7 +5991,7 @@
     </p:spTree>
     <p:extLst>
       <p:ext uri="{BB962C8B-B14F-4D97-AF65-F5344CB8AC3E}">
-        <p14:creationId xmlns:p14="http://schemas.microsoft.com/office/powerpoint/2010/main" val="1888324395"/>
+        <p14:creationId xmlns:p14="http://schemas.microsoft.com/office/powerpoint/2010/main" xmlns="" val="1888324395"/>
       </p:ext>
     </p:extLst>
   </p:cSld>
@@ -6238,7 +6238,7 @@
               <a:pPr>
                 <a:defRPr/>
               </a:pPr>
-              <a:t>10/01/2012</a:t>
+              <a:t>11/01/2012</a:t>
             </a:fld>
             <a:endParaRPr lang="en-GB"/>
           </a:p>
@@ -6306,7 +6306,7 @@
     </p:spTree>
     <p:extLst>
       <p:ext uri="{BB962C8B-B14F-4D97-AF65-F5344CB8AC3E}">
-        <p14:creationId xmlns:p14="http://schemas.microsoft.com/office/powerpoint/2010/main" val="1757655369"/>
+        <p14:creationId xmlns:p14="http://schemas.microsoft.com/office/powerpoint/2010/main" xmlns="" val="1757655369"/>
       </p:ext>
     </p:extLst>
   </p:cSld>
@@ -6687,7 +6687,7 @@
               <a:pPr>
                 <a:defRPr/>
               </a:pPr>
-              <a:t>10/01/2012</a:t>
+              <a:t>11/01/2012</a:t>
             </a:fld>
             <a:endParaRPr lang="en-GB"/>
           </a:p>
@@ -6755,7 +6755,7 @@
     </p:spTree>
     <p:extLst>
       <p:ext uri="{BB962C8B-B14F-4D97-AF65-F5344CB8AC3E}">
-        <p14:creationId xmlns:p14="http://schemas.microsoft.com/office/powerpoint/2010/main" val="71682349"/>
+        <p14:creationId xmlns:p14="http://schemas.microsoft.com/office/powerpoint/2010/main" xmlns="" val="71682349"/>
       </p:ext>
     </p:extLst>
   </p:cSld>
@@ -6832,7 +6832,7 @@
               <a:pPr>
                 <a:defRPr/>
               </a:pPr>
-              <a:t>10/01/2012</a:t>
+              <a:t>11/01/2012</a:t>
             </a:fld>
             <a:endParaRPr lang="en-GB"/>
           </a:p>
@@ -6900,7 +6900,7 @@
     </p:spTree>
     <p:extLst>
       <p:ext uri="{BB962C8B-B14F-4D97-AF65-F5344CB8AC3E}">
-        <p14:creationId xmlns:p14="http://schemas.microsoft.com/office/powerpoint/2010/main" val="3929246842"/>
+        <p14:creationId xmlns:p14="http://schemas.microsoft.com/office/powerpoint/2010/main" xmlns="" val="3929246842"/>
       </p:ext>
     </p:extLst>
   </p:cSld>
@@ -6954,7 +6954,7 @@
               <a:pPr>
                 <a:defRPr/>
               </a:pPr>
-              <a:t>10/01/2012</a:t>
+              <a:t>11/01/2012</a:t>
             </a:fld>
             <a:endParaRPr lang="en-GB"/>
           </a:p>
@@ -7022,7 +7022,7 @@
     </p:spTree>
     <p:extLst>
       <p:ext uri="{BB962C8B-B14F-4D97-AF65-F5344CB8AC3E}">
-        <p14:creationId xmlns:p14="http://schemas.microsoft.com/office/powerpoint/2010/main" val="389225915"/>
+        <p14:creationId xmlns:p14="http://schemas.microsoft.com/office/powerpoint/2010/main" xmlns="" val="389225915"/>
       </p:ext>
     </p:extLst>
   </p:cSld>
@@ -7258,7 +7258,7 @@
               <a:pPr>
                 <a:defRPr/>
               </a:pPr>
-              <a:t>10/01/2012</a:t>
+              <a:t>11/01/2012</a:t>
             </a:fld>
             <a:endParaRPr lang="en-GB"/>
           </a:p>
@@ -7326,7 +7326,7 @@
     </p:spTree>
     <p:extLst>
       <p:ext uri="{BB962C8B-B14F-4D97-AF65-F5344CB8AC3E}">
-        <p14:creationId xmlns:p14="http://schemas.microsoft.com/office/powerpoint/2010/main" val="2845097973"/>
+        <p14:creationId xmlns:p14="http://schemas.microsoft.com/office/powerpoint/2010/main" xmlns="" val="2845097973"/>
       </p:ext>
     </p:extLst>
   </p:cSld>
@@ -7541,7 +7541,7 @@
               <a:pPr>
                 <a:defRPr/>
               </a:pPr>
-              <a:t>10/01/2012</a:t>
+              <a:t>11/01/2012</a:t>
             </a:fld>
             <a:endParaRPr lang="en-GB"/>
           </a:p>
@@ -7609,7 +7609,7 @@
     </p:spTree>
     <p:extLst>
       <p:ext uri="{BB962C8B-B14F-4D97-AF65-F5344CB8AC3E}">
-        <p14:creationId xmlns:p14="http://schemas.microsoft.com/office/powerpoint/2010/main" val="1440302658"/>
+        <p14:creationId xmlns:p14="http://schemas.microsoft.com/office/powerpoint/2010/main" xmlns="" val="1440302658"/>
       </p:ext>
     </p:extLst>
   </p:cSld>
@@ -7665,14 +7665,14 @@
           </a:ln>
           <a:extLst>
             <a:ext uri="{909E8E84-426E-40DD-AFC4-6F175D3DCCD1}">
-              <a14:hiddenFill xmlns:a14="http://schemas.microsoft.com/office/drawing/2010/main">
+              <a14:hiddenFill xmlns:a14="http://schemas.microsoft.com/office/drawing/2010/main" xmlns="">
                 <a:solidFill>
                   <a:srgbClr val="FFFFFF"/>
                 </a:solidFill>
               </a14:hiddenFill>
             </a:ext>
             <a:ext uri="{91240B29-F687-4F45-9708-019B960494DF}">
-              <a14:hiddenLine xmlns:a14="http://schemas.microsoft.com/office/drawing/2010/main" w="9525">
+              <a14:hiddenLine xmlns:a14="http://schemas.microsoft.com/office/drawing/2010/main" xmlns="" w="9525">
                 <a:solidFill>
                   <a:srgbClr val="000000"/>
                 </a:solidFill>
@@ -7724,14 +7724,14 @@
           </a:ln>
           <a:extLst>
             <a:ext uri="{909E8E84-426E-40DD-AFC4-6F175D3DCCD1}">
-              <a14:hiddenFill xmlns:a14="http://schemas.microsoft.com/office/drawing/2010/main">
+              <a14:hiddenFill xmlns:a14="http://schemas.microsoft.com/office/drawing/2010/main" xmlns="">
                 <a:solidFill>
                   <a:srgbClr val="FFFFFF"/>
                 </a:solidFill>
               </a14:hiddenFill>
             </a:ext>
             <a:ext uri="{91240B29-F687-4F45-9708-019B960494DF}">
-              <a14:hiddenLine xmlns:a14="http://schemas.microsoft.com/office/drawing/2010/main" w="9525">
+              <a14:hiddenLine xmlns:a14="http://schemas.microsoft.com/office/drawing/2010/main" xmlns="" w="9525">
                 <a:solidFill>
                   <a:srgbClr val="000000"/>
                 </a:solidFill>
@@ -7828,7 +7828,7 @@
               <a:pPr>
                 <a:defRPr/>
               </a:pPr>
-              <a:t>10/01/2012</a:t>
+              <a:t>11/01/2012</a:t>
             </a:fld>
             <a:endParaRPr lang="en-GB"/>
           </a:p>
@@ -8610,7 +8610,7 @@
           <a:blip r:embed="rId3" cstate="print">
             <a:extLst>
               <a:ext uri="{28A0092B-C50C-407E-A947-70E740481C1C}">
-                <a14:useLocalDpi xmlns:a14="http://schemas.microsoft.com/office/drawing/2010/main" val="0"/>
+                <a14:useLocalDpi xmlns:a14="http://schemas.microsoft.com/office/drawing/2010/main" xmlns="" val="0"/>
               </a:ext>
             </a:extLst>
           </a:blip>
@@ -8630,7 +8630,7 @@
           <a:noFill/>
           <a:extLst>
             <a:ext uri="{909E8E84-426E-40DD-AFC4-6F175D3DCCD1}">
-              <a14:hiddenFill xmlns:a14="http://schemas.microsoft.com/office/drawing/2010/main">
+              <a14:hiddenFill xmlns:a14="http://schemas.microsoft.com/office/drawing/2010/main" xmlns="">
                 <a:solidFill>
                   <a:srgbClr val="FFFFFF"/>
                 </a:solidFill>
@@ -8651,7 +8651,7 @@
           <a:blip r:embed="rId3" cstate="print">
             <a:extLst>
               <a:ext uri="{28A0092B-C50C-407E-A947-70E740481C1C}">
-                <a14:useLocalDpi xmlns:a14="http://schemas.microsoft.com/office/drawing/2010/main" val="0"/>
+                <a14:useLocalDpi xmlns:a14="http://schemas.microsoft.com/office/drawing/2010/main" xmlns="" val="0"/>
               </a:ext>
             </a:extLst>
           </a:blip>
@@ -8671,7 +8671,7 @@
           <a:noFill/>
           <a:extLst>
             <a:ext uri="{909E8E84-426E-40DD-AFC4-6F175D3DCCD1}">
-              <a14:hiddenFill xmlns:a14="http://schemas.microsoft.com/office/drawing/2010/main">
+              <a14:hiddenFill xmlns:a14="http://schemas.microsoft.com/office/drawing/2010/main" xmlns="">
                 <a:solidFill>
                   <a:srgbClr val="FFFFFF"/>
                 </a:solidFill>
@@ -8692,7 +8692,7 @@
           <a:blip r:embed="rId3" cstate="print">
             <a:extLst>
               <a:ext uri="{28A0092B-C50C-407E-A947-70E740481C1C}">
-                <a14:useLocalDpi xmlns:a14="http://schemas.microsoft.com/office/drawing/2010/main" val="0"/>
+                <a14:useLocalDpi xmlns:a14="http://schemas.microsoft.com/office/drawing/2010/main" xmlns="" val="0"/>
               </a:ext>
             </a:extLst>
           </a:blip>
@@ -8712,7 +8712,7 @@
           <a:noFill/>
           <a:extLst>
             <a:ext uri="{909E8E84-426E-40DD-AFC4-6F175D3DCCD1}">
-              <a14:hiddenFill xmlns:a14="http://schemas.microsoft.com/office/drawing/2010/main">
+              <a14:hiddenFill xmlns:a14="http://schemas.microsoft.com/office/drawing/2010/main" xmlns="">
                 <a:solidFill>
                   <a:srgbClr val="FFFFFF"/>
                 </a:solidFill>
@@ -8724,7 +8724,7 @@
     </p:spTree>
     <p:extLst>
       <p:ext uri="{BB962C8B-B14F-4D97-AF65-F5344CB8AC3E}">
-        <p14:creationId xmlns:p14="http://schemas.microsoft.com/office/powerpoint/2010/main" val="1067741861"/>
+        <p14:creationId xmlns:p14="http://schemas.microsoft.com/office/powerpoint/2010/main" xmlns="" val="1067741861"/>
       </p:ext>
     </p:extLst>
   </p:cSld>
@@ -8972,7 +8972,7 @@
           <a:p>
             <a:pPr eaLnBrk="1" hangingPunct="1"/>
             <a:r>
-              <a:rPr lang="en-GB" dirty="0" smtClean="0"/>
+              <a:rPr lang="en-GB" strike="sngStrike" dirty="0" smtClean="0"/>
               <a:t>Interrupt download of image, save incomplete image</a:t>
             </a:r>
           </a:p>
@@ -9004,7 +9004,7 @@
           <a:blip r:embed="rId3" cstate="print">
             <a:extLst>
               <a:ext uri="{28A0092B-C50C-407E-A947-70E740481C1C}">
-                <a14:useLocalDpi xmlns:a14="http://schemas.microsoft.com/office/drawing/2010/main" val="0"/>
+                <a14:useLocalDpi xmlns:a14="http://schemas.microsoft.com/office/drawing/2010/main" xmlns="" val="0"/>
               </a:ext>
             </a:extLst>
           </a:blip>
@@ -9024,7 +9024,7 @@
           <a:noFill/>
           <a:extLst>
             <a:ext uri="{909E8E84-426E-40DD-AFC4-6F175D3DCCD1}">
-              <a14:hiddenFill xmlns:a14="http://schemas.microsoft.com/office/drawing/2010/main">
+              <a14:hiddenFill xmlns:a14="http://schemas.microsoft.com/office/drawing/2010/main" xmlns="">
                 <a:solidFill>
                   <a:srgbClr val="FFFFFF"/>
                 </a:solidFill>
@@ -9045,7 +9045,7 @@
           <a:blip r:embed="rId3" cstate="print">
             <a:extLst>
               <a:ext uri="{28A0092B-C50C-407E-A947-70E740481C1C}">
-                <a14:useLocalDpi xmlns:a14="http://schemas.microsoft.com/office/drawing/2010/main" val="0"/>
+                <a14:useLocalDpi xmlns:a14="http://schemas.microsoft.com/office/drawing/2010/main" xmlns="" val="0"/>
               </a:ext>
             </a:extLst>
           </a:blip>
@@ -9065,7 +9065,7 @@
           <a:noFill/>
           <a:extLst>
             <a:ext uri="{909E8E84-426E-40DD-AFC4-6F175D3DCCD1}">
-              <a14:hiddenFill xmlns:a14="http://schemas.microsoft.com/office/drawing/2010/main">
+              <a14:hiddenFill xmlns:a14="http://schemas.microsoft.com/office/drawing/2010/main" xmlns="">
                 <a:solidFill>
                   <a:srgbClr val="FFFFFF"/>
                 </a:solidFill>
@@ -9086,7 +9086,7 @@
           <a:blip r:embed="rId3" cstate="print">
             <a:extLst>
               <a:ext uri="{28A0092B-C50C-407E-A947-70E740481C1C}">
-                <a14:useLocalDpi xmlns:a14="http://schemas.microsoft.com/office/drawing/2010/main" val="0"/>
+                <a14:useLocalDpi xmlns:a14="http://schemas.microsoft.com/office/drawing/2010/main" xmlns="" val="0"/>
               </a:ext>
             </a:extLst>
           </a:blip>
@@ -9106,7 +9106,48 @@
           <a:noFill/>
           <a:extLst>
             <a:ext uri="{909E8E84-426E-40DD-AFC4-6F175D3DCCD1}">
-              <a14:hiddenFill xmlns:a14="http://schemas.microsoft.com/office/drawing/2010/main">
+              <a14:hiddenFill xmlns:a14="http://schemas.microsoft.com/office/drawing/2010/main" xmlns="">
+                <a:solidFill>
+                  <a:srgbClr val="FFFFFF"/>
+                </a:solidFill>
+              </a14:hiddenFill>
+            </a:ext>
+          </a:extLst>
+        </p:spPr>
+      </p:pic>
+      <p:pic>
+        <p:nvPicPr>
+          <p:cNvPr id="7" name="Picture 7" descr="http://www.clker.com/cliparts/e/3/9/7/1245686792938124914raemi_Check_mark.svg.hi.png"/>
+          <p:cNvPicPr>
+            <a:picLocks noChangeAspect="1" noChangeArrowheads="1"/>
+          </p:cNvPicPr>
+          <p:nvPr/>
+        </p:nvPicPr>
+        <p:blipFill>
+          <a:blip r:embed="rId3" cstate="print">
+            <a:extLst>
+              <a:ext uri="{28A0092B-C50C-407E-A947-70E740481C1C}">
+                <a14:useLocalDpi xmlns:a14="http://schemas.microsoft.com/office/drawing/2010/main" xmlns="" val="0"/>
+              </a:ext>
+            </a:extLst>
+          </a:blip>
+          <a:srcRect/>
+          <a:stretch>
+            <a:fillRect/>
+          </a:stretch>
+        </p:blipFill>
+        <p:spPr bwMode="auto">
+          <a:xfrm>
+            <a:off x="2051720" y="3284984"/>
+            <a:ext cx="438917" cy="406858"/>
+          </a:xfrm>
+          <a:prstGeom prst="rect">
+            <a:avLst/>
+          </a:prstGeom>
+          <a:noFill/>
+          <a:extLst>
+            <a:ext uri="{909E8E84-426E-40DD-AFC4-6F175D3DCCD1}">
+              <a14:hiddenFill xmlns:a14="http://schemas.microsoft.com/office/drawing/2010/main" xmlns="">
                 <a:solidFill>
                   <a:srgbClr val="FFFFFF"/>
                 </a:solidFill>
@@ -9118,7 +9159,7 @@
     </p:spTree>
     <p:extLst>
       <p:ext uri="{BB962C8B-B14F-4D97-AF65-F5344CB8AC3E}">
-        <p14:creationId xmlns:p14="http://schemas.microsoft.com/office/powerpoint/2010/main" val="1159920066"/>
+        <p14:creationId xmlns:p14="http://schemas.microsoft.com/office/powerpoint/2010/main" xmlns="" val="1159920066"/>
       </p:ext>
     </p:extLst>
   </p:cSld>
@@ -9254,7 +9295,7 @@
           <a:blip r:embed="rId2" cstate="print">
             <a:extLst>
               <a:ext uri="{28A0092B-C50C-407E-A947-70E740481C1C}">
-                <a14:useLocalDpi xmlns:a14="http://schemas.microsoft.com/office/drawing/2010/main" val="0"/>
+                <a14:useLocalDpi xmlns:a14="http://schemas.microsoft.com/office/drawing/2010/main" xmlns="" val="0"/>
               </a:ext>
             </a:extLst>
           </a:blip>
@@ -9274,7 +9315,7 @@
           <a:noFill/>
           <a:extLst>
             <a:ext uri="{909E8E84-426E-40DD-AFC4-6F175D3DCCD1}">
-              <a14:hiddenFill xmlns:a14="http://schemas.microsoft.com/office/drawing/2010/main">
+              <a14:hiddenFill xmlns:a14="http://schemas.microsoft.com/office/drawing/2010/main" xmlns="">
                 <a:solidFill>
                   <a:srgbClr val="FFFFFF"/>
                 </a:solidFill>
@@ -9295,7 +9336,7 @@
           <a:blip r:embed="rId2" cstate="print">
             <a:extLst>
               <a:ext uri="{28A0092B-C50C-407E-A947-70E740481C1C}">
-                <a14:useLocalDpi xmlns:a14="http://schemas.microsoft.com/office/drawing/2010/main" val="0"/>
+                <a14:useLocalDpi xmlns:a14="http://schemas.microsoft.com/office/drawing/2010/main" xmlns="" val="0"/>
               </a:ext>
             </a:extLst>
           </a:blip>
@@ -9315,7 +9356,7 @@
           <a:noFill/>
           <a:extLst>
             <a:ext uri="{909E8E84-426E-40DD-AFC4-6F175D3DCCD1}">
-              <a14:hiddenFill xmlns:a14="http://schemas.microsoft.com/office/drawing/2010/main">
+              <a14:hiddenFill xmlns:a14="http://schemas.microsoft.com/office/drawing/2010/main" xmlns="">
                 <a:solidFill>
                   <a:srgbClr val="FFFFFF"/>
                 </a:solidFill>
@@ -9327,7 +9368,7 @@
     </p:spTree>
     <p:extLst>
       <p:ext uri="{BB962C8B-B14F-4D97-AF65-F5344CB8AC3E}">
-        <p14:creationId xmlns:p14="http://schemas.microsoft.com/office/powerpoint/2010/main" val="3590650378"/>
+        <p14:creationId xmlns:p14="http://schemas.microsoft.com/office/powerpoint/2010/main" xmlns="" val="3590650378"/>
       </p:ext>
     </p:extLst>
   </p:cSld>
@@ -9447,7 +9488,7 @@
     </p:spTree>
     <p:extLst>
       <p:ext uri="{BB962C8B-B14F-4D97-AF65-F5344CB8AC3E}">
-        <p14:creationId xmlns:p14="http://schemas.microsoft.com/office/powerpoint/2010/main" val="288895558"/>
+        <p14:creationId xmlns:p14="http://schemas.microsoft.com/office/powerpoint/2010/main" xmlns="" val="288895558"/>
       </p:ext>
     </p:extLst>
   </p:cSld>
@@ -9640,7 +9681,7 @@
           <a:blip r:embed="rId4" cstate="print">
             <a:extLst>
               <a:ext uri="{28A0092B-C50C-407E-A947-70E740481C1C}">
-                <a14:useLocalDpi xmlns:a14="http://schemas.microsoft.com/office/drawing/2010/main" val="0"/>
+                <a14:useLocalDpi xmlns:a14="http://schemas.microsoft.com/office/drawing/2010/main" xmlns="" val="0"/>
               </a:ext>
             </a:extLst>
           </a:blip>
@@ -9660,7 +9701,7 @@
           <a:noFill/>
           <a:extLst>
             <a:ext uri="{909E8E84-426E-40DD-AFC4-6F175D3DCCD1}">
-              <a14:hiddenFill xmlns:a14="http://schemas.microsoft.com/office/drawing/2010/main">
+              <a14:hiddenFill xmlns:a14="http://schemas.microsoft.com/office/drawing/2010/main" xmlns="">
                 <a:solidFill>
                   <a:srgbClr val="FFFFFF"/>
                 </a:solidFill>
@@ -9681,7 +9722,7 @@
           <a:blip r:embed="rId4" cstate="print">
             <a:extLst>
               <a:ext uri="{28A0092B-C50C-407E-A947-70E740481C1C}">
-                <a14:useLocalDpi xmlns:a14="http://schemas.microsoft.com/office/drawing/2010/main" val="0"/>
+                <a14:useLocalDpi xmlns:a14="http://schemas.microsoft.com/office/drawing/2010/main" xmlns="" val="0"/>
               </a:ext>
             </a:extLst>
           </a:blip>
@@ -9701,7 +9742,7 @@
           <a:noFill/>
           <a:extLst>
             <a:ext uri="{909E8E84-426E-40DD-AFC4-6F175D3DCCD1}">
-              <a14:hiddenFill xmlns:a14="http://schemas.microsoft.com/office/drawing/2010/main">
+              <a14:hiddenFill xmlns:a14="http://schemas.microsoft.com/office/drawing/2010/main" xmlns="">
                 <a:solidFill>
                   <a:srgbClr val="FFFFFF"/>
                 </a:solidFill>
@@ -9722,7 +9763,7 @@
           <a:blip r:embed="rId4" cstate="print">
             <a:extLst>
               <a:ext uri="{28A0092B-C50C-407E-A947-70E740481C1C}">
-                <a14:useLocalDpi xmlns:a14="http://schemas.microsoft.com/office/drawing/2010/main" val="0"/>
+                <a14:useLocalDpi xmlns:a14="http://schemas.microsoft.com/office/drawing/2010/main" xmlns="" val="0"/>
               </a:ext>
             </a:extLst>
           </a:blip>
@@ -9742,7 +9783,7 @@
           <a:noFill/>
           <a:extLst>
             <a:ext uri="{909E8E84-426E-40DD-AFC4-6F175D3DCCD1}">
-              <a14:hiddenFill xmlns:a14="http://schemas.microsoft.com/office/drawing/2010/main">
+              <a14:hiddenFill xmlns:a14="http://schemas.microsoft.com/office/drawing/2010/main" xmlns="">
                 <a:solidFill>
                   <a:srgbClr val="FFFFFF"/>
                 </a:solidFill>
@@ -9763,7 +9804,7 @@
           <a:blip r:embed="rId4" cstate="print">
             <a:extLst>
               <a:ext uri="{28A0092B-C50C-407E-A947-70E740481C1C}">
-                <a14:useLocalDpi xmlns:a14="http://schemas.microsoft.com/office/drawing/2010/main" val="0"/>
+                <a14:useLocalDpi xmlns:a14="http://schemas.microsoft.com/office/drawing/2010/main" xmlns="" val="0"/>
               </a:ext>
             </a:extLst>
           </a:blip>
@@ -9783,7 +9824,7 @@
           <a:noFill/>
           <a:extLst>
             <a:ext uri="{909E8E84-426E-40DD-AFC4-6F175D3DCCD1}">
-              <a14:hiddenFill xmlns:a14="http://schemas.microsoft.com/office/drawing/2010/main">
+              <a14:hiddenFill xmlns:a14="http://schemas.microsoft.com/office/drawing/2010/main" xmlns="">
                 <a:solidFill>
                   <a:srgbClr val="FFFFFF"/>
                 </a:solidFill>
@@ -9795,7 +9836,7 @@
     </p:spTree>
     <p:extLst>
       <p:ext uri="{BB962C8B-B14F-4D97-AF65-F5344CB8AC3E}">
-        <p14:creationId xmlns:p14="http://schemas.microsoft.com/office/powerpoint/2010/main" val="4140405347"/>
+        <p14:creationId xmlns:p14="http://schemas.microsoft.com/office/powerpoint/2010/main" xmlns="" val="4140405347"/>
       </p:ext>
     </p:extLst>
   </p:cSld>
@@ -9875,7 +9916,7 @@
     </p:spTree>
     <p:extLst>
       <p:ext uri="{BB962C8B-B14F-4D97-AF65-F5344CB8AC3E}">
-        <p14:creationId xmlns:p14="http://schemas.microsoft.com/office/powerpoint/2010/main" val="1689647387"/>
+        <p14:creationId xmlns:p14="http://schemas.microsoft.com/office/powerpoint/2010/main" xmlns="" val="1689647387"/>
       </p:ext>
     </p:extLst>
   </p:cSld>
@@ -9976,10 +10017,10 @@
           <p:nvPr/>
         </p:nvPicPr>
         <p:blipFill>
-          <a:blip r:embed="rId2">
+          <a:blip r:embed="rId2" cstate="print">
             <a:extLst>
               <a:ext uri="{28A0092B-C50C-407E-A947-70E740481C1C}">
-                <a14:useLocalDpi xmlns:a14="http://schemas.microsoft.com/office/drawing/2010/main" val="0"/>
+                <a14:useLocalDpi xmlns:a14="http://schemas.microsoft.com/office/drawing/2010/main" xmlns="" val="0"/>
               </a:ext>
             </a:extLst>
           </a:blip>
@@ -10002,14 +10043,14 @@
           </a:ln>
           <a:extLst>
             <a:ext uri="{909E8E84-426E-40DD-AFC4-6F175D3DCCD1}">
-              <a14:hiddenFill xmlns:a14="http://schemas.microsoft.com/office/drawing/2010/main">
+              <a14:hiddenFill xmlns:a14="http://schemas.microsoft.com/office/drawing/2010/main" xmlns="">
                 <a:solidFill>
                   <a:srgbClr val="FFFFFF"/>
                 </a:solidFill>
               </a14:hiddenFill>
             </a:ext>
             <a:ext uri="{91240B29-F687-4F45-9708-019B960494DF}">
-              <a14:hiddenLine xmlns:a14="http://schemas.microsoft.com/office/drawing/2010/main" w="9525">
+              <a14:hiddenLine xmlns:a14="http://schemas.microsoft.com/office/drawing/2010/main" xmlns="" w="9525">
                 <a:solidFill>
                   <a:srgbClr val="000000"/>
                 </a:solidFill>
@@ -10441,7 +10482,7 @@
     </p:spTree>
     <p:extLst>
       <p:ext uri="{BB962C8B-B14F-4D97-AF65-F5344CB8AC3E}">
-        <p14:creationId xmlns:p14="http://schemas.microsoft.com/office/powerpoint/2010/main" val="570125005"/>
+        <p14:creationId xmlns:p14="http://schemas.microsoft.com/office/powerpoint/2010/main" xmlns="" val="570125005"/>
       </p:ext>
     </p:extLst>
   </p:cSld>
@@ -10542,10 +10583,10 @@
           <p:nvPr/>
         </p:nvPicPr>
         <p:blipFill>
-          <a:blip r:embed="rId2">
+          <a:blip r:embed="rId2" cstate="print">
             <a:extLst>
               <a:ext uri="{28A0092B-C50C-407E-A947-70E740481C1C}">
-                <a14:useLocalDpi xmlns:a14="http://schemas.microsoft.com/office/drawing/2010/main" val="0"/>
+                <a14:useLocalDpi xmlns:a14="http://schemas.microsoft.com/office/drawing/2010/main" xmlns="" val="0"/>
               </a:ext>
             </a:extLst>
           </a:blip>
@@ -10568,14 +10609,14 @@
           </a:ln>
           <a:extLst>
             <a:ext uri="{909E8E84-426E-40DD-AFC4-6F175D3DCCD1}">
-              <a14:hiddenFill xmlns:a14="http://schemas.microsoft.com/office/drawing/2010/main">
+              <a14:hiddenFill xmlns:a14="http://schemas.microsoft.com/office/drawing/2010/main" xmlns="">
                 <a:solidFill>
                   <a:srgbClr val="FFFFFF"/>
                 </a:solidFill>
               </a14:hiddenFill>
             </a:ext>
             <a:ext uri="{91240B29-F687-4F45-9708-019B960494DF}">
-              <a14:hiddenLine xmlns:a14="http://schemas.microsoft.com/office/drawing/2010/main" w="9525">
+              <a14:hiddenLine xmlns:a14="http://schemas.microsoft.com/office/drawing/2010/main" xmlns="" w="9525">
                 <a:solidFill>
                   <a:srgbClr val="000000"/>
                 </a:solidFill>
@@ -11048,7 +11089,7 @@
     </p:spTree>
     <p:extLst>
       <p:ext uri="{BB962C8B-B14F-4D97-AF65-F5344CB8AC3E}">
-        <p14:creationId xmlns:p14="http://schemas.microsoft.com/office/powerpoint/2010/main" val="373231475"/>
+        <p14:creationId xmlns:p14="http://schemas.microsoft.com/office/powerpoint/2010/main" xmlns="" val="373231475"/>
       </p:ext>
     </p:extLst>
   </p:cSld>
@@ -11343,16 +11384,13 @@
             </a:r>
           </a:p>
           <a:p>
-            <a:pPr lvl="1"/>
+            <a:r>
+              <a:rPr lang="en-GB" smtClean="0"/>
+              <a:t>E.g</a:t>
+            </a:r>
             <a:r>
               <a:rPr lang="en-GB" dirty="0" smtClean="0"/>
-              <a:t>For image data acknowledgment sent every 50 data packets</a:t>
-            </a:r>
-          </a:p>
-          <a:p>
-            <a:r>
-              <a:rPr lang="en-GB" dirty="0" smtClean="0"/>
-              <a:t>E.g. </a:t>
+              <a:t>. </a:t>
             </a:r>
             <a:r>
               <a:rPr lang="en-GB" b="1" dirty="0" smtClean="0"/>
@@ -11478,7 +11516,7 @@
     </p:spTree>
     <p:extLst>
       <p:ext uri="{BB962C8B-B14F-4D97-AF65-F5344CB8AC3E}">
-        <p14:creationId xmlns:p14="http://schemas.microsoft.com/office/powerpoint/2010/main" val="3184989868"/>
+        <p14:creationId xmlns:p14="http://schemas.microsoft.com/office/powerpoint/2010/main" xmlns="" val="3184989868"/>
       </p:ext>
     </p:extLst>
   </p:cSld>
@@ -11600,10 +11638,10 @@
           <p:nvPr/>
         </p:nvPicPr>
         <p:blipFill>
-          <a:blip r:embed="rId2">
+          <a:blip r:embed="rId2" cstate="print">
             <a:extLst>
               <a:ext uri="{28A0092B-C50C-407E-A947-70E740481C1C}">
-                <a14:useLocalDpi xmlns:a14="http://schemas.microsoft.com/office/drawing/2010/main" val="0"/>
+                <a14:useLocalDpi xmlns:a14="http://schemas.microsoft.com/office/drawing/2010/main" xmlns="" val="0"/>
               </a:ext>
             </a:extLst>
           </a:blip>
@@ -11623,7 +11661,7 @@
           <a:noFill/>
           <a:extLst>
             <a:ext uri="{909E8E84-426E-40DD-AFC4-6F175D3DCCD1}">
-              <a14:hiddenFill xmlns:a14="http://schemas.microsoft.com/office/drawing/2010/main">
+              <a14:hiddenFill xmlns:a14="http://schemas.microsoft.com/office/drawing/2010/main" xmlns="">
                 <a:solidFill>
                   <a:srgbClr val="FFFFFF"/>
                 </a:solidFill>
@@ -11695,7 +11733,7 @@
     </p:spTree>
     <p:extLst>
       <p:ext uri="{BB962C8B-B14F-4D97-AF65-F5344CB8AC3E}">
-        <p14:creationId xmlns:p14="http://schemas.microsoft.com/office/powerpoint/2010/main" val="2268161591"/>
+        <p14:creationId xmlns:p14="http://schemas.microsoft.com/office/powerpoint/2010/main" xmlns="" val="2268161591"/>
       </p:ext>
     </p:extLst>
   </p:cSld>
@@ -11780,10 +11818,10 @@
           <p:nvPr/>
         </p:nvPicPr>
         <p:blipFill>
-          <a:blip r:embed="rId2">
+          <a:blip r:embed="rId2" cstate="print">
             <a:extLst>
               <a:ext uri="{28A0092B-C50C-407E-A947-70E740481C1C}">
-                <a14:useLocalDpi xmlns:a14="http://schemas.microsoft.com/office/drawing/2010/main" val="0"/>
+                <a14:useLocalDpi xmlns:a14="http://schemas.microsoft.com/office/drawing/2010/main" xmlns="" val="0"/>
               </a:ext>
             </a:extLst>
           </a:blip>
@@ -11803,7 +11841,7 @@
           <a:noFill/>
           <a:extLst>
             <a:ext uri="{909E8E84-426E-40DD-AFC4-6F175D3DCCD1}">
-              <a14:hiddenFill xmlns:a14="http://schemas.microsoft.com/office/drawing/2010/main">
+              <a14:hiddenFill xmlns:a14="http://schemas.microsoft.com/office/drawing/2010/main" xmlns="">
                 <a:solidFill>
                   <a:srgbClr val="FFFFFF"/>
                 </a:solidFill>
@@ -11815,7 +11853,7 @@
     </p:spTree>
     <p:extLst>
       <p:ext uri="{BB962C8B-B14F-4D97-AF65-F5344CB8AC3E}">
-        <p14:creationId xmlns:p14="http://schemas.microsoft.com/office/powerpoint/2010/main" val="3830370783"/>
+        <p14:creationId xmlns:p14="http://schemas.microsoft.com/office/powerpoint/2010/main" xmlns="" val="3830370783"/>
       </p:ext>
     </p:extLst>
   </p:cSld>
@@ -11934,7 +11972,7 @@
     </p:spTree>
     <p:extLst>
       <p:ext uri="{BB962C8B-B14F-4D97-AF65-F5344CB8AC3E}">
-        <p14:creationId xmlns:p14="http://schemas.microsoft.com/office/powerpoint/2010/main" val="4256342207"/>
+        <p14:creationId xmlns:p14="http://schemas.microsoft.com/office/powerpoint/2010/main" xmlns="" val="4256342207"/>
       </p:ext>
     </p:extLst>
   </p:cSld>
@@ -12001,7 +12039,7 @@
             <p:ph idx="1"/>
             <p:extLst>
               <p:ext uri="{D42A27DB-BD31-4B8C-83A1-F6EECF244321}">
-                <p14:modId xmlns:p14="http://schemas.microsoft.com/office/powerpoint/2010/main" val="1480063700"/>
+                <p14:modId xmlns:p14="http://schemas.microsoft.com/office/powerpoint/2010/main" xmlns="" val="1480063700"/>
               </p:ext>
             </p:extLst>
           </p:nvPr>
@@ -12241,7 +12279,7 @@
                     <a:p>
                       <a:r>
                         <a:rPr lang="en-GB" dirty="0" smtClean="0"/>
-                        <a:t>TOTAL</a:t>
+                        <a:t>TOTAL*</a:t>
                       </a:r>
                       <a:endParaRPr lang="en-GB" dirty="0"/>
                     </a:p>
@@ -12281,10 +12319,40 @@
           </a:graphicData>
         </a:graphic>
       </p:graphicFrame>
+      <p:sp>
+        <p:nvSpPr>
+          <p:cNvPr id="4" name="TextBox 3"/>
+          <p:cNvSpPr txBox="1"/>
+          <p:nvPr/>
+        </p:nvSpPr>
+        <p:spPr>
+          <a:xfrm>
+            <a:off x="899592" y="4941168"/>
+            <a:ext cx="2232248" cy="369332"/>
+          </a:xfrm>
+          <a:prstGeom prst="rect">
+            <a:avLst/>
+          </a:prstGeom>
+          <a:noFill/>
+        </p:spPr>
+        <p:txBody>
+          <a:bodyPr wrap="square" rtlCol="0">
+            <a:spAutoFit/>
+          </a:bodyPr>
+          <a:lstStyle/>
+          <a:p>
+            <a:r>
+              <a:rPr lang="en-GB" dirty="0" smtClean="0"/>
+              <a:t>* one-off production</a:t>
+            </a:r>
+            <a:endParaRPr lang="en-GB" dirty="0"/>
+          </a:p>
+        </p:txBody>
+      </p:sp>
     </p:spTree>
     <p:extLst>
       <p:ext uri="{BB962C8B-B14F-4D97-AF65-F5344CB8AC3E}">
-        <p14:creationId xmlns:p14="http://schemas.microsoft.com/office/powerpoint/2010/main" val="2679709734"/>
+        <p14:creationId xmlns:p14="http://schemas.microsoft.com/office/powerpoint/2010/main" xmlns="" val="2679709734"/>
       </p:ext>
     </p:extLst>
   </p:cSld>
@@ -12363,7 +12431,7 @@
     </p:spTree>
     <p:extLst>
       <p:ext uri="{BB962C8B-B14F-4D97-AF65-F5344CB8AC3E}">
-        <p14:creationId xmlns:p14="http://schemas.microsoft.com/office/powerpoint/2010/main" val="701477937"/>
+        <p14:creationId xmlns:p14="http://schemas.microsoft.com/office/powerpoint/2010/main" xmlns="" val="701477937"/>
       </p:ext>
     </p:extLst>
   </p:cSld>
@@ -12473,10 +12541,10 @@
           <p:nvPr/>
         </p:nvPicPr>
         <p:blipFill>
-          <a:blip r:embed="rId2">
+          <a:blip r:embed="rId2" cstate="print">
             <a:extLst>
               <a:ext uri="{28A0092B-C50C-407E-A947-70E740481C1C}">
-                <a14:useLocalDpi xmlns:a14="http://schemas.microsoft.com/office/drawing/2010/main" val="0"/>
+                <a14:useLocalDpi xmlns:a14="http://schemas.microsoft.com/office/drawing/2010/main" xmlns="" val="0"/>
               </a:ext>
             </a:extLst>
           </a:blip>
@@ -12500,14 +12568,14 @@
           <a:effectLst/>
           <a:extLst>
             <a:ext uri="{909E8E84-426E-40DD-AFC4-6F175D3DCCD1}">
-              <a14:hiddenFill xmlns:a14="http://schemas.microsoft.com/office/drawing/2010/main">
+              <a14:hiddenFill xmlns:a14="http://schemas.microsoft.com/office/drawing/2010/main" xmlns="">
                 <a:solidFill>
                   <a:schemeClr val="accent1"/>
                 </a:solidFill>
               </a14:hiddenFill>
             </a:ext>
             <a:ext uri="{91240B29-F687-4F45-9708-019B960494DF}">
-              <a14:hiddenLine xmlns:a14="http://schemas.microsoft.com/office/drawing/2010/main" w="9525">
+              <a14:hiddenLine xmlns:a14="http://schemas.microsoft.com/office/drawing/2010/main" xmlns="" w="9525">
                 <a:solidFill>
                   <a:schemeClr val="tx1"/>
                 </a:solidFill>
@@ -12517,7 +12585,7 @@
               </a14:hiddenLine>
             </a:ext>
             <a:ext uri="{AF507438-7753-43E0-B8FC-AC1667EBCBE1}">
-              <a14:hiddenEffects xmlns:a14="http://schemas.microsoft.com/office/drawing/2010/main">
+              <a14:hiddenEffects xmlns:a14="http://schemas.microsoft.com/office/drawing/2010/main" xmlns="">
                 <a:effectLst>
                   <a:outerShdw dist="35921" dir="2700000" algn="ctr" rotWithShape="0">
                     <a:schemeClr val="bg2"/>
@@ -12540,7 +12608,7 @@
           <a:blip r:embed="rId3" cstate="print">
             <a:extLst>
               <a:ext uri="{28A0092B-C50C-407E-A947-70E740481C1C}">
-                <a14:useLocalDpi xmlns:a14="http://schemas.microsoft.com/office/drawing/2010/main" val="0"/>
+                <a14:useLocalDpi xmlns:a14="http://schemas.microsoft.com/office/drawing/2010/main" xmlns="" val="0"/>
               </a:ext>
             </a:extLst>
           </a:blip>
@@ -12558,7 +12626,7 @@
           <a:noFill/>
           <a:extLst>
             <a:ext uri="{909E8E84-426E-40DD-AFC4-6F175D3DCCD1}">
-              <a14:hiddenFill xmlns:a14="http://schemas.microsoft.com/office/drawing/2010/main">
+              <a14:hiddenFill xmlns:a14="http://schemas.microsoft.com/office/drawing/2010/main" xmlns="">
                 <a:solidFill>
                   <a:srgbClr val="FFFFFF"/>
                 </a:solidFill>
@@ -12570,7 +12638,7 @@
     </p:spTree>
     <p:extLst>
       <p:ext uri="{BB962C8B-B14F-4D97-AF65-F5344CB8AC3E}">
-        <p14:creationId xmlns:p14="http://schemas.microsoft.com/office/powerpoint/2010/main" val="548240289"/>
+        <p14:creationId xmlns:p14="http://schemas.microsoft.com/office/powerpoint/2010/main" xmlns="" val="548240289"/>
       </p:ext>
     </p:extLst>
   </p:cSld>
@@ -12946,7 +13014,7 @@
     </p:spTree>
     <p:extLst>
       <p:ext uri="{BB962C8B-B14F-4D97-AF65-F5344CB8AC3E}">
-        <p14:creationId xmlns:p14="http://schemas.microsoft.com/office/powerpoint/2010/main" val="3550109443"/>
+        <p14:creationId xmlns:p14="http://schemas.microsoft.com/office/powerpoint/2010/main" xmlns="" val="3550109443"/>
       </p:ext>
     </p:extLst>
   </p:cSld>
@@ -13012,10 +13080,10 @@
           <p:nvPr/>
         </p:nvPicPr>
         <p:blipFill>
-          <a:blip r:embed="rId2">
+          <a:blip r:embed="rId2" cstate="print">
             <a:extLst>
               <a:ext uri="{28A0092B-C50C-407E-A947-70E740481C1C}">
-                <a14:useLocalDpi xmlns:a14="http://schemas.microsoft.com/office/drawing/2010/main" val="0"/>
+                <a14:useLocalDpi xmlns:a14="http://schemas.microsoft.com/office/drawing/2010/main" xmlns="" val="0"/>
               </a:ext>
             </a:extLst>
           </a:blip>
@@ -13039,14 +13107,14 @@
           <a:effectLst/>
           <a:extLst>
             <a:ext uri="{909E8E84-426E-40DD-AFC4-6F175D3DCCD1}">
-              <a14:hiddenFill xmlns:a14="http://schemas.microsoft.com/office/drawing/2010/main">
+              <a14:hiddenFill xmlns:a14="http://schemas.microsoft.com/office/drawing/2010/main" xmlns="">
                 <a:solidFill>
                   <a:schemeClr val="accent1"/>
                 </a:solidFill>
               </a14:hiddenFill>
             </a:ext>
             <a:ext uri="{91240B29-F687-4F45-9708-019B960494DF}">
-              <a14:hiddenLine xmlns:a14="http://schemas.microsoft.com/office/drawing/2010/main" w="9525">
+              <a14:hiddenLine xmlns:a14="http://schemas.microsoft.com/office/drawing/2010/main" xmlns="" w="9525">
                 <a:solidFill>
                   <a:schemeClr val="tx1"/>
                 </a:solidFill>
@@ -13056,7 +13124,7 @@
               </a14:hiddenLine>
             </a:ext>
             <a:ext uri="{AF507438-7753-43E0-B8FC-AC1667EBCBE1}">
-              <a14:hiddenEffects xmlns:a14="http://schemas.microsoft.com/office/drawing/2010/main">
+              <a14:hiddenEffects xmlns:a14="http://schemas.microsoft.com/office/drawing/2010/main" xmlns="">
                 <a:effectLst>
                   <a:outerShdw dist="35921" dir="2700000" algn="ctr" rotWithShape="0">
                     <a:schemeClr val="bg2"/>
@@ -13079,7 +13147,7 @@
           <a:blip r:embed="rId3" cstate="print">
             <a:extLst>
               <a:ext uri="{28A0092B-C50C-407E-A947-70E740481C1C}">
-                <a14:useLocalDpi xmlns:a14="http://schemas.microsoft.com/office/drawing/2010/main" val="0"/>
+                <a14:useLocalDpi xmlns:a14="http://schemas.microsoft.com/office/drawing/2010/main" xmlns="" val="0"/>
               </a:ext>
             </a:extLst>
           </a:blip>
@@ -13097,7 +13165,7 @@
           <a:noFill/>
           <a:extLst>
             <a:ext uri="{909E8E84-426E-40DD-AFC4-6F175D3DCCD1}">
-              <a14:hiddenFill xmlns:a14="http://schemas.microsoft.com/office/drawing/2010/main">
+              <a14:hiddenFill xmlns:a14="http://schemas.microsoft.com/office/drawing/2010/main" xmlns="">
                 <a:solidFill>
                   <a:srgbClr val="FFFFFF"/>
                 </a:solidFill>
@@ -13117,10 +13185,10 @@
           </p:nvPr>
         </p:nvPicPr>
         <p:blipFill>
-          <a:blip r:embed="rId4">
+          <a:blip r:embed="rId4" cstate="print">
             <a:extLst>
               <a:ext uri="{28A0092B-C50C-407E-A947-70E740481C1C}">
-                <a14:useLocalDpi xmlns:a14="http://schemas.microsoft.com/office/drawing/2010/main" val="0"/>
+                <a14:useLocalDpi xmlns:a14="http://schemas.microsoft.com/office/drawing/2010/main" xmlns="" val="0"/>
               </a:ext>
             </a:extLst>
           </a:blip>
@@ -13144,14 +13212,14 @@
           <a:effectLst/>
           <a:extLst>
             <a:ext uri="{909E8E84-426E-40DD-AFC4-6F175D3DCCD1}">
-              <a14:hiddenFill xmlns:a14="http://schemas.microsoft.com/office/drawing/2010/main">
+              <a14:hiddenFill xmlns:a14="http://schemas.microsoft.com/office/drawing/2010/main" xmlns="">
                 <a:solidFill>
                   <a:schemeClr val="accent1"/>
                 </a:solidFill>
               </a14:hiddenFill>
             </a:ext>
             <a:ext uri="{91240B29-F687-4F45-9708-019B960494DF}">
-              <a14:hiddenLine xmlns:a14="http://schemas.microsoft.com/office/drawing/2010/main" w="9525">
+              <a14:hiddenLine xmlns:a14="http://schemas.microsoft.com/office/drawing/2010/main" xmlns="" w="9525">
                 <a:solidFill>
                   <a:schemeClr val="tx1"/>
                 </a:solidFill>
@@ -13161,7 +13229,7 @@
               </a14:hiddenLine>
             </a:ext>
             <a:ext uri="{AF507438-7753-43E0-B8FC-AC1667EBCBE1}">
-              <a14:hiddenEffects xmlns:a14="http://schemas.microsoft.com/office/drawing/2010/main">
+              <a14:hiddenEffects xmlns:a14="http://schemas.microsoft.com/office/drawing/2010/main" xmlns="">
                 <a:effectLst>
                   <a:outerShdw dist="35921" dir="2700000" algn="ctr" rotWithShape="0">
                     <a:schemeClr val="bg2"/>
@@ -13315,7 +13383,7 @@
     </p:spTree>
     <p:extLst>
       <p:ext uri="{BB962C8B-B14F-4D97-AF65-F5344CB8AC3E}">
-        <p14:creationId xmlns:p14="http://schemas.microsoft.com/office/powerpoint/2010/main" val="4002675474"/>
+        <p14:creationId xmlns:p14="http://schemas.microsoft.com/office/powerpoint/2010/main" xmlns="" val="4002675474"/>
       </p:ext>
     </p:extLst>
   </p:cSld>
@@ -13384,7 +13452,7 @@
           <a:blip r:embed="rId3" cstate="print">
             <a:extLst>
               <a:ext uri="{28A0092B-C50C-407E-A947-70E740481C1C}">
-                <a14:useLocalDpi xmlns:a14="http://schemas.microsoft.com/office/drawing/2010/main" val="0"/>
+                <a14:useLocalDpi xmlns:a14="http://schemas.microsoft.com/office/drawing/2010/main" xmlns="" val="0"/>
               </a:ext>
             </a:extLst>
           </a:blip>
@@ -13408,14 +13476,14 @@
           <a:effectLst/>
           <a:extLst>
             <a:ext uri="{909E8E84-426E-40DD-AFC4-6F175D3DCCD1}">
-              <a14:hiddenFill xmlns:a14="http://schemas.microsoft.com/office/drawing/2010/main">
+              <a14:hiddenFill xmlns:a14="http://schemas.microsoft.com/office/drawing/2010/main" xmlns="">
                 <a:solidFill>
                   <a:schemeClr val="accent1"/>
                 </a:solidFill>
               </a14:hiddenFill>
             </a:ext>
             <a:ext uri="{91240B29-F687-4F45-9708-019B960494DF}">
-              <a14:hiddenLine xmlns:a14="http://schemas.microsoft.com/office/drawing/2010/main" w="9525">
+              <a14:hiddenLine xmlns:a14="http://schemas.microsoft.com/office/drawing/2010/main" xmlns="" w="9525">
                 <a:solidFill>
                   <a:schemeClr val="tx1"/>
                 </a:solidFill>
@@ -13425,7 +13493,7 @@
               </a14:hiddenLine>
             </a:ext>
             <a:ext uri="{AF507438-7753-43E0-B8FC-AC1667EBCBE1}">
-              <a14:hiddenEffects xmlns:a14="http://schemas.microsoft.com/office/drawing/2010/main">
+              <a14:hiddenEffects xmlns:a14="http://schemas.microsoft.com/office/drawing/2010/main" xmlns="">
                 <a:effectLst>
                   <a:outerShdw dist="35921" dir="2700000" algn="ctr" rotWithShape="0">
                     <a:schemeClr val="bg2"/>
@@ -13488,7 +13556,7 @@
           <a:blip r:embed="rId4" cstate="print">
             <a:extLst>
               <a:ext uri="{28A0092B-C50C-407E-A947-70E740481C1C}">
-                <a14:useLocalDpi xmlns:a14="http://schemas.microsoft.com/office/drawing/2010/main" val="0"/>
+                <a14:useLocalDpi xmlns:a14="http://schemas.microsoft.com/office/drawing/2010/main" xmlns="" val="0"/>
               </a:ext>
             </a:extLst>
           </a:blip>
@@ -13508,7 +13576,7 @@
           <a:noFill/>
           <a:extLst>
             <a:ext uri="{909E8E84-426E-40DD-AFC4-6F175D3DCCD1}">
-              <a14:hiddenFill xmlns:a14="http://schemas.microsoft.com/office/drawing/2010/main">
+              <a14:hiddenFill xmlns:a14="http://schemas.microsoft.com/office/drawing/2010/main" xmlns="">
                 <a:solidFill>
                   <a:srgbClr val="FFFFFF"/>
                 </a:solidFill>
@@ -13529,7 +13597,7 @@
           <a:blip r:embed="rId5" cstate="print">
             <a:extLst>
               <a:ext uri="{28A0092B-C50C-407E-A947-70E740481C1C}">
-                <a14:useLocalDpi xmlns:a14="http://schemas.microsoft.com/office/drawing/2010/main" val="0"/>
+                <a14:useLocalDpi xmlns:a14="http://schemas.microsoft.com/office/drawing/2010/main" xmlns="" val="0"/>
               </a:ext>
             </a:extLst>
           </a:blip>
@@ -13553,14 +13621,14 @@
           <a:effectLst/>
           <a:extLst>
             <a:ext uri="{909E8E84-426E-40DD-AFC4-6F175D3DCCD1}">
-              <a14:hiddenFill xmlns:a14="http://schemas.microsoft.com/office/drawing/2010/main">
+              <a14:hiddenFill xmlns:a14="http://schemas.microsoft.com/office/drawing/2010/main" xmlns="">
                 <a:solidFill>
                   <a:schemeClr val="accent1"/>
                 </a:solidFill>
               </a14:hiddenFill>
             </a:ext>
             <a:ext uri="{91240B29-F687-4F45-9708-019B960494DF}">
-              <a14:hiddenLine xmlns:a14="http://schemas.microsoft.com/office/drawing/2010/main" w="9525">
+              <a14:hiddenLine xmlns:a14="http://schemas.microsoft.com/office/drawing/2010/main" xmlns="" w="9525">
                 <a:solidFill>
                   <a:schemeClr val="tx1"/>
                 </a:solidFill>
@@ -13570,7 +13638,7 @@
               </a14:hiddenLine>
             </a:ext>
             <a:ext uri="{AF507438-7753-43E0-B8FC-AC1667EBCBE1}">
-              <a14:hiddenEffects xmlns:a14="http://schemas.microsoft.com/office/drawing/2010/main">
+              <a14:hiddenEffects xmlns:a14="http://schemas.microsoft.com/office/drawing/2010/main" xmlns="">
                 <a:effectLst>
                   <a:outerShdw dist="35921" dir="2700000" algn="ctr" rotWithShape="0">
                     <a:schemeClr val="bg2"/>
@@ -13814,7 +13882,7 @@
     </p:spTree>
     <p:extLst>
       <p:ext uri="{BB962C8B-B14F-4D97-AF65-F5344CB8AC3E}">
-        <p14:creationId xmlns:p14="http://schemas.microsoft.com/office/powerpoint/2010/main" val="933310491"/>
+        <p14:creationId xmlns:p14="http://schemas.microsoft.com/office/powerpoint/2010/main" xmlns="" val="933310491"/>
       </p:ext>
     </p:extLst>
   </p:cSld>
@@ -13968,7 +14036,7 @@
           <a:blip r:embed="rId2" cstate="print">
             <a:extLst>
               <a:ext uri="{28A0092B-C50C-407E-A947-70E740481C1C}">
-                <a14:useLocalDpi xmlns:a14="http://schemas.microsoft.com/office/drawing/2010/main" val="0"/>
+                <a14:useLocalDpi xmlns:a14="http://schemas.microsoft.com/office/drawing/2010/main" xmlns="" val="0"/>
               </a:ext>
             </a:extLst>
           </a:blip>
@@ -13990,14 +14058,14 @@
           <a:effectLst/>
           <a:extLst>
             <a:ext uri="{909E8E84-426E-40DD-AFC4-6F175D3DCCD1}">
-              <a14:hiddenFill xmlns:a14="http://schemas.microsoft.com/office/drawing/2010/main">
+              <a14:hiddenFill xmlns:a14="http://schemas.microsoft.com/office/drawing/2010/main" xmlns="">
                 <a:solidFill>
                   <a:schemeClr val="accent1"/>
                 </a:solidFill>
               </a14:hiddenFill>
             </a:ext>
             <a:ext uri="{91240B29-F687-4F45-9708-019B960494DF}">
-              <a14:hiddenLine xmlns:a14="http://schemas.microsoft.com/office/drawing/2010/main" w="9525">
+              <a14:hiddenLine xmlns:a14="http://schemas.microsoft.com/office/drawing/2010/main" xmlns="" w="9525">
                 <a:solidFill>
                   <a:schemeClr val="tx1"/>
                 </a:solidFill>
@@ -14007,7 +14075,7 @@
               </a14:hiddenLine>
             </a:ext>
             <a:ext uri="{AF507438-7753-43E0-B8FC-AC1667EBCBE1}">
-              <a14:hiddenEffects xmlns:a14="http://schemas.microsoft.com/office/drawing/2010/main">
+              <a14:hiddenEffects xmlns:a14="http://schemas.microsoft.com/office/drawing/2010/main" xmlns="">
                 <a:effectLst>
                   <a:outerShdw dist="35921" dir="2700000" algn="ctr" rotWithShape="0">
                     <a:schemeClr val="bg2"/>
@@ -14030,7 +14098,7 @@
           <a:blip r:embed="rId3" cstate="print">
             <a:extLst>
               <a:ext uri="{28A0092B-C50C-407E-A947-70E740481C1C}">
-                <a14:useLocalDpi xmlns:a14="http://schemas.microsoft.com/office/drawing/2010/main" val="0"/>
+                <a14:useLocalDpi xmlns:a14="http://schemas.microsoft.com/office/drawing/2010/main" xmlns="" val="0"/>
               </a:ext>
             </a:extLst>
           </a:blip>
@@ -14054,14 +14122,14 @@
           <a:effectLst/>
           <a:extLst>
             <a:ext uri="{909E8E84-426E-40DD-AFC4-6F175D3DCCD1}">
-              <a14:hiddenFill xmlns:a14="http://schemas.microsoft.com/office/drawing/2010/main">
+              <a14:hiddenFill xmlns:a14="http://schemas.microsoft.com/office/drawing/2010/main" xmlns="">
                 <a:solidFill>
                   <a:schemeClr val="accent1"/>
                 </a:solidFill>
               </a14:hiddenFill>
             </a:ext>
             <a:ext uri="{91240B29-F687-4F45-9708-019B960494DF}">
-              <a14:hiddenLine xmlns:a14="http://schemas.microsoft.com/office/drawing/2010/main" w="9525">
+              <a14:hiddenLine xmlns:a14="http://schemas.microsoft.com/office/drawing/2010/main" xmlns="" w="9525">
                 <a:solidFill>
                   <a:schemeClr val="tx1"/>
                 </a:solidFill>
@@ -14071,7 +14139,7 @@
               </a14:hiddenLine>
             </a:ext>
             <a:ext uri="{AF507438-7753-43E0-B8FC-AC1667EBCBE1}">
-              <a14:hiddenEffects xmlns:a14="http://schemas.microsoft.com/office/drawing/2010/main">
+              <a14:hiddenEffects xmlns:a14="http://schemas.microsoft.com/office/drawing/2010/main" xmlns="">
                 <a:effectLst>
                   <a:outerShdw dist="35921" dir="2700000" algn="ctr" rotWithShape="0">
                     <a:schemeClr val="bg2"/>
@@ -14094,7 +14162,7 @@
           <a:blip r:embed="rId4" cstate="print">
             <a:extLst>
               <a:ext uri="{28A0092B-C50C-407E-A947-70E740481C1C}">
-                <a14:useLocalDpi xmlns:a14="http://schemas.microsoft.com/office/drawing/2010/main" val="0"/>
+                <a14:useLocalDpi xmlns:a14="http://schemas.microsoft.com/office/drawing/2010/main" xmlns="" val="0"/>
               </a:ext>
             </a:extLst>
           </a:blip>
@@ -14118,14 +14186,14 @@
           <a:effectLst/>
           <a:extLst>
             <a:ext uri="{909E8E84-426E-40DD-AFC4-6F175D3DCCD1}">
-              <a14:hiddenFill xmlns:a14="http://schemas.microsoft.com/office/drawing/2010/main">
+              <a14:hiddenFill xmlns:a14="http://schemas.microsoft.com/office/drawing/2010/main" xmlns="">
                 <a:solidFill>
                   <a:schemeClr val="accent1"/>
                 </a:solidFill>
               </a14:hiddenFill>
             </a:ext>
             <a:ext uri="{91240B29-F687-4F45-9708-019B960494DF}">
-              <a14:hiddenLine xmlns:a14="http://schemas.microsoft.com/office/drawing/2010/main" w="9525">
+              <a14:hiddenLine xmlns:a14="http://schemas.microsoft.com/office/drawing/2010/main" xmlns="" w="9525">
                 <a:solidFill>
                   <a:schemeClr val="tx1"/>
                 </a:solidFill>
@@ -14135,7 +14203,7 @@
               </a14:hiddenLine>
             </a:ext>
             <a:ext uri="{AF507438-7753-43E0-B8FC-AC1667EBCBE1}">
-              <a14:hiddenEffects xmlns:a14="http://schemas.microsoft.com/office/drawing/2010/main">
+              <a14:hiddenEffects xmlns:a14="http://schemas.microsoft.com/office/drawing/2010/main" xmlns="">
                 <a:effectLst>
                   <a:outerShdw dist="35921" dir="2700000" algn="ctr" rotWithShape="0">
                     <a:schemeClr val="bg2"/>
@@ -14350,7 +14418,7 @@
           <a:blip r:embed="rId5" cstate="print">
             <a:extLst>
               <a:ext uri="{28A0092B-C50C-407E-A947-70E740481C1C}">
-                <a14:useLocalDpi xmlns:a14="http://schemas.microsoft.com/office/drawing/2010/main" val="0"/>
+                <a14:useLocalDpi xmlns:a14="http://schemas.microsoft.com/office/drawing/2010/main" xmlns="" val="0"/>
               </a:ext>
             </a:extLst>
           </a:blip>
@@ -14370,7 +14438,7 @@
           <a:noFill/>
           <a:extLst>
             <a:ext uri="{909E8E84-426E-40DD-AFC4-6F175D3DCCD1}">
-              <a14:hiddenFill xmlns:a14="http://schemas.microsoft.com/office/drawing/2010/main">
+              <a14:hiddenFill xmlns:a14="http://schemas.microsoft.com/office/drawing/2010/main" xmlns="">
                 <a:solidFill>
                   <a:srgbClr val="FFFFFF"/>
                 </a:solidFill>
@@ -14453,7 +14521,7 @@
     </p:spTree>
     <p:extLst>
       <p:ext uri="{BB962C8B-B14F-4D97-AF65-F5344CB8AC3E}">
-        <p14:creationId xmlns:p14="http://schemas.microsoft.com/office/powerpoint/2010/main" val="2361177310"/>
+        <p14:creationId xmlns:p14="http://schemas.microsoft.com/office/powerpoint/2010/main" xmlns="" val="2361177310"/>
       </p:ext>
     </p:extLst>
   </p:cSld>
@@ -14550,7 +14618,7 @@
     </p:spTree>
     <p:extLst>
       <p:ext uri="{BB962C8B-B14F-4D97-AF65-F5344CB8AC3E}">
-        <p14:creationId xmlns:p14="http://schemas.microsoft.com/office/powerpoint/2010/main" val="1547665822"/>
+        <p14:creationId xmlns:p14="http://schemas.microsoft.com/office/powerpoint/2010/main" xmlns="" val="1547665822"/>
       </p:ext>
     </p:extLst>
   </p:cSld>
@@ -14594,11 +14662,7 @@
           <a:p>
             <a:r>
               <a:rPr lang="en-GB" smtClean="0"/>
-              <a:t>JPEG </a:t>
-            </a:r>
-            <a:r>
-              <a:rPr lang="en-GB" smtClean="0"/>
-              <a:t>Header Extractor </a:t>
+              <a:t>JPEG Header Extractor </a:t>
             </a:r>
             <a:r>
               <a:rPr lang="en-GB" dirty="0" smtClean="0"/>
@@ -14668,7 +14732,7 @@
           <a:blip r:embed="rId2" cstate="print">
             <a:extLst>
               <a:ext uri="{28A0092B-C50C-407E-A947-70E740481C1C}">
-                <a14:useLocalDpi xmlns:a14="http://schemas.microsoft.com/office/drawing/2010/main" val="0"/>
+                <a14:useLocalDpi xmlns:a14="http://schemas.microsoft.com/office/drawing/2010/main" xmlns="" val="0"/>
               </a:ext>
             </a:extLst>
           </a:blip>
@@ -14692,14 +14756,14 @@
           <a:effectLst/>
           <a:extLst>
             <a:ext uri="{909E8E84-426E-40DD-AFC4-6F175D3DCCD1}">
-              <a14:hiddenFill xmlns:a14="http://schemas.microsoft.com/office/drawing/2010/main">
+              <a14:hiddenFill xmlns:a14="http://schemas.microsoft.com/office/drawing/2010/main" xmlns="">
                 <a:solidFill>
                   <a:schemeClr val="accent1"/>
                 </a:solidFill>
               </a14:hiddenFill>
             </a:ext>
             <a:ext uri="{91240B29-F687-4F45-9708-019B960494DF}">
-              <a14:hiddenLine xmlns:a14="http://schemas.microsoft.com/office/drawing/2010/main" w="9525">
+              <a14:hiddenLine xmlns:a14="http://schemas.microsoft.com/office/drawing/2010/main" xmlns="" w="9525">
                 <a:solidFill>
                   <a:schemeClr val="tx1"/>
                 </a:solidFill>
@@ -14709,7 +14773,7 @@
               </a14:hiddenLine>
             </a:ext>
             <a:ext uri="{AF507438-7753-43E0-B8FC-AC1667EBCBE1}">
-              <a14:hiddenEffects xmlns:a14="http://schemas.microsoft.com/office/drawing/2010/main">
+              <a14:hiddenEffects xmlns:a14="http://schemas.microsoft.com/office/drawing/2010/main" xmlns="">
                 <a:effectLst>
                   <a:outerShdw dist="35921" dir="2700000" algn="ctr" rotWithShape="0">
                     <a:schemeClr val="bg2"/>
@@ -14723,7 +14787,7 @@
     </p:spTree>
     <p:extLst>
       <p:ext uri="{BB962C8B-B14F-4D97-AF65-F5344CB8AC3E}">
-        <p14:creationId xmlns:p14="http://schemas.microsoft.com/office/powerpoint/2010/main" val="717048240"/>
+        <p14:creationId xmlns:p14="http://schemas.microsoft.com/office/powerpoint/2010/main" xmlns="" val="717048240"/>
       </p:ext>
     </p:extLst>
   </p:cSld>
@@ -14808,10 +14872,10 @@
           <p:nvPr/>
         </p:nvPicPr>
         <p:blipFill>
-          <a:blip r:embed="rId2">
+          <a:blip r:embed="rId2" cstate="print">
             <a:extLst>
               <a:ext uri="{28A0092B-C50C-407E-A947-70E740481C1C}">
-                <a14:useLocalDpi xmlns:a14="http://schemas.microsoft.com/office/drawing/2010/main" val="0"/>
+                <a14:useLocalDpi xmlns:a14="http://schemas.microsoft.com/office/drawing/2010/main" xmlns="" val="0"/>
               </a:ext>
             </a:extLst>
           </a:blip>
@@ -14835,14 +14899,14 @@
           <a:effectLst/>
           <a:extLst>
             <a:ext uri="{909E8E84-426E-40DD-AFC4-6F175D3DCCD1}">
-              <a14:hiddenFill xmlns:a14="http://schemas.microsoft.com/office/drawing/2010/main">
+              <a14:hiddenFill xmlns:a14="http://schemas.microsoft.com/office/drawing/2010/main" xmlns="">
                 <a:solidFill>
                   <a:schemeClr val="accent1"/>
                 </a:solidFill>
               </a14:hiddenFill>
             </a:ext>
             <a:ext uri="{91240B29-F687-4F45-9708-019B960494DF}">
-              <a14:hiddenLine xmlns:a14="http://schemas.microsoft.com/office/drawing/2010/main" w="9525">
+              <a14:hiddenLine xmlns:a14="http://schemas.microsoft.com/office/drawing/2010/main" xmlns="" w="9525">
                 <a:solidFill>
                   <a:schemeClr val="tx1"/>
                 </a:solidFill>
@@ -14852,7 +14916,7 @@
               </a14:hiddenLine>
             </a:ext>
             <a:ext uri="{AF507438-7753-43E0-B8FC-AC1667EBCBE1}">
-              <a14:hiddenEffects xmlns:a14="http://schemas.microsoft.com/office/drawing/2010/main">
+              <a14:hiddenEffects xmlns:a14="http://schemas.microsoft.com/office/drawing/2010/main" xmlns="">
                 <a:effectLst>
                   <a:outerShdw dist="35921" dir="2700000" algn="ctr" rotWithShape="0">
                     <a:schemeClr val="bg2"/>
@@ -14866,7 +14930,7 @@
     </p:spTree>
     <p:extLst>
       <p:ext uri="{BB962C8B-B14F-4D97-AF65-F5344CB8AC3E}">
-        <p14:creationId xmlns:p14="http://schemas.microsoft.com/office/powerpoint/2010/main" val="3315437432"/>
+        <p14:creationId xmlns:p14="http://schemas.microsoft.com/office/powerpoint/2010/main" xmlns="" val="3315437432"/>
       </p:ext>
     </p:extLst>
   </p:cSld>
@@ -14954,14 +15018,27 @@
             <a:pPr lvl="1"/>
             <a:r>
               <a:rPr lang="en-GB" dirty="0" smtClean="0"/>
-              <a:t>~12s Download</a:t>
-            </a:r>
+              <a:t>~</a:t>
+            </a:r>
+            <a:r>
+              <a:rPr lang="en-GB" dirty="0" smtClean="0"/>
+              <a:t>6</a:t>
+            </a:r>
+            <a:r>
+              <a:rPr lang="en-GB" dirty="0" smtClean="0"/>
+              <a:t>0s Download (low packet loss)</a:t>
+            </a:r>
+            <a:endParaRPr lang="en-GB" dirty="0" smtClean="0"/>
           </a:p>
           <a:p>
             <a:pPr lvl="1"/>
             <a:r>
               <a:rPr lang="en-GB" dirty="0" smtClean="0"/>
-              <a:t>~20s Total</a:t>
+              <a:t>~70s </a:t>
+            </a:r>
+            <a:r>
+              <a:rPr lang="en-GB" dirty="0" smtClean="0"/>
+              <a:t>Total</a:t>
             </a:r>
           </a:p>
           <a:p>
@@ -14990,7 +15067,7 @@
     </p:spTree>
     <p:extLst>
       <p:ext uri="{BB962C8B-B14F-4D97-AF65-F5344CB8AC3E}">
-        <p14:creationId xmlns:p14="http://schemas.microsoft.com/office/powerpoint/2010/main" val="4017750841"/>
+        <p14:creationId xmlns:p14="http://schemas.microsoft.com/office/powerpoint/2010/main" xmlns="" val="4017750841"/>
       </p:ext>
     </p:extLst>
   </p:cSld>
@@ -15062,7 +15139,7 @@
     </p:spTree>
     <p:extLst>
       <p:ext uri="{BB962C8B-B14F-4D97-AF65-F5344CB8AC3E}">
-        <p14:creationId xmlns:p14="http://schemas.microsoft.com/office/powerpoint/2010/main" val="3003318231"/>
+        <p14:creationId xmlns:p14="http://schemas.microsoft.com/office/powerpoint/2010/main" xmlns="" val="3003318231"/>
       </p:ext>
     </p:extLst>
   </p:cSld>
@@ -15141,7 +15218,7 @@
     </p:spTree>
     <p:extLst>
       <p:ext uri="{BB962C8B-B14F-4D97-AF65-F5344CB8AC3E}">
-        <p14:creationId xmlns:p14="http://schemas.microsoft.com/office/powerpoint/2010/main" val="3221971414"/>
+        <p14:creationId xmlns:p14="http://schemas.microsoft.com/office/powerpoint/2010/main" xmlns="" val="3221971414"/>
       </p:ext>
     </p:extLst>
   </p:cSld>
@@ -15200,10 +15277,10 @@
           <p:nvPr/>
         </p:nvPicPr>
         <p:blipFill>
-          <a:blip r:embed="rId2">
+          <a:blip r:embed="rId2" cstate="print">
             <a:extLst>
               <a:ext uri="{28A0092B-C50C-407E-A947-70E740481C1C}">
-                <a14:useLocalDpi xmlns:a14="http://schemas.microsoft.com/office/drawing/2010/main" val="0"/>
+                <a14:useLocalDpi xmlns:a14="http://schemas.microsoft.com/office/drawing/2010/main" xmlns="" val="0"/>
               </a:ext>
             </a:extLst>
           </a:blip>
@@ -15223,7 +15300,7 @@
           <a:noFill/>
           <a:extLst>
             <a:ext uri="{909E8E84-426E-40DD-AFC4-6F175D3DCCD1}">
-              <a14:hiddenFill xmlns:a14="http://schemas.microsoft.com/office/drawing/2010/main">
+              <a14:hiddenFill xmlns:a14="http://schemas.microsoft.com/office/drawing/2010/main" xmlns="">
                 <a:solidFill>
                   <a:srgbClr val="FFFFFF"/>
                 </a:solidFill>
@@ -15918,7 +15995,7 @@
     </p:spTree>
     <p:extLst>
       <p:ext uri="{BB962C8B-B14F-4D97-AF65-F5344CB8AC3E}">
-        <p14:creationId xmlns:p14="http://schemas.microsoft.com/office/powerpoint/2010/main" val="1017847691"/>
+        <p14:creationId xmlns:p14="http://schemas.microsoft.com/office/powerpoint/2010/main" xmlns="" val="1017847691"/>
       </p:ext>
     </p:extLst>
   </p:cSld>
@@ -16027,7 +16104,7 @@
     </p:spTree>
     <p:extLst>
       <p:ext uri="{BB962C8B-B14F-4D97-AF65-F5344CB8AC3E}">
-        <p14:creationId xmlns:p14="http://schemas.microsoft.com/office/powerpoint/2010/main" val="3453639089"/>
+        <p14:creationId xmlns:p14="http://schemas.microsoft.com/office/powerpoint/2010/main" xmlns="" val="3453639089"/>
       </p:ext>
     </p:extLst>
   </p:cSld>
@@ -16136,7 +16213,7 @@
     </p:spTree>
     <p:extLst>
       <p:ext uri="{BB962C8B-B14F-4D97-AF65-F5344CB8AC3E}">
-        <p14:creationId xmlns:p14="http://schemas.microsoft.com/office/powerpoint/2010/main" val="3427870486"/>
+        <p14:creationId xmlns:p14="http://schemas.microsoft.com/office/powerpoint/2010/main" xmlns="" val="3427870486"/>
       </p:ext>
     </p:extLst>
   </p:cSld>
@@ -16366,7 +16443,7 @@
     </p:spTree>
     <p:extLst>
       <p:ext uri="{BB962C8B-B14F-4D97-AF65-F5344CB8AC3E}">
-        <p14:creationId xmlns:p14="http://schemas.microsoft.com/office/powerpoint/2010/main" val="1458841859"/>
+        <p14:creationId xmlns:p14="http://schemas.microsoft.com/office/powerpoint/2010/main" xmlns="" val="1458841859"/>
       </p:ext>
     </p:extLst>
   </p:cSld>
@@ -16445,7 +16522,7 @@
     </p:spTree>
     <p:extLst>
       <p:ext uri="{BB962C8B-B14F-4D97-AF65-F5344CB8AC3E}">
-        <p14:creationId xmlns:p14="http://schemas.microsoft.com/office/powerpoint/2010/main" val="348287360"/>
+        <p14:creationId xmlns:p14="http://schemas.microsoft.com/office/powerpoint/2010/main" xmlns="" val="348287360"/>
       </p:ext>
     </p:extLst>
   </p:cSld>
@@ -16524,7 +16601,7 @@
           <a:p>
             <a:r>
               <a:rPr lang="en-GB" dirty="0" smtClean="0"/>
-              <a:t>We have delivered a working system to our customer. ##FINGERS CROSSED FOR TOMORROW##</a:t>
+              <a:t>We have delivered a working system to our customer. </a:t>
             </a:r>
             <a:endParaRPr lang="en-GB" dirty="0"/>
           </a:p>
@@ -16533,7 +16610,7 @@
     </p:spTree>
     <p:extLst>
       <p:ext uri="{BB962C8B-B14F-4D97-AF65-F5344CB8AC3E}">
-        <p14:creationId xmlns:p14="http://schemas.microsoft.com/office/powerpoint/2010/main" val="755361449"/>
+        <p14:creationId xmlns:p14="http://schemas.microsoft.com/office/powerpoint/2010/main" xmlns="" val="755361449"/>
       </p:ext>
     </p:extLst>
   </p:cSld>
@@ -16596,10 +16673,10 @@
           <p:nvPr/>
         </p:nvPicPr>
         <p:blipFill>
-          <a:blip r:embed="rId3">
+          <a:blip r:embed="rId3" cstate="print">
             <a:extLst>
               <a:ext uri="{28A0092B-C50C-407E-A947-70E740481C1C}">
-                <a14:useLocalDpi xmlns:a14="http://schemas.microsoft.com/office/drawing/2010/main" val="0"/>
+                <a14:useLocalDpi xmlns:a14="http://schemas.microsoft.com/office/drawing/2010/main" xmlns="" val="0"/>
               </a:ext>
             </a:extLst>
           </a:blip>
@@ -16623,14 +16700,14 @@
           <a:effectLst/>
           <a:extLst>
             <a:ext uri="{909E8E84-426E-40DD-AFC4-6F175D3DCCD1}">
-              <a14:hiddenFill xmlns:a14="http://schemas.microsoft.com/office/drawing/2010/main">
+              <a14:hiddenFill xmlns:a14="http://schemas.microsoft.com/office/drawing/2010/main" xmlns="">
                 <a:solidFill>
                   <a:schemeClr val="accent1"/>
                 </a:solidFill>
               </a14:hiddenFill>
             </a:ext>
             <a:ext uri="{91240B29-F687-4F45-9708-019B960494DF}">
-              <a14:hiddenLine xmlns:a14="http://schemas.microsoft.com/office/drawing/2010/main" w="9525">
+              <a14:hiddenLine xmlns:a14="http://schemas.microsoft.com/office/drawing/2010/main" xmlns="" w="9525">
                 <a:solidFill>
                   <a:schemeClr val="tx1"/>
                 </a:solidFill>
@@ -16640,7 +16717,7 @@
               </a14:hiddenLine>
             </a:ext>
             <a:ext uri="{AF507438-7753-43E0-B8FC-AC1667EBCBE1}">
-              <a14:hiddenEffects xmlns:a14="http://schemas.microsoft.com/office/drawing/2010/main">
+              <a14:hiddenEffects xmlns:a14="http://schemas.microsoft.com/office/drawing/2010/main" xmlns="">
                 <a:effectLst>
                   <a:outerShdw dist="35921" dir="2700000" algn="ctr" rotWithShape="0">
                     <a:schemeClr val="bg2"/>
@@ -16800,10 +16877,10 @@
           <p:nvPr/>
         </p:nvPicPr>
         <p:blipFill>
-          <a:blip r:embed="rId3">
+          <a:blip r:embed="rId3" cstate="print">
             <a:extLst>
               <a:ext uri="{28A0092B-C50C-407E-A947-70E740481C1C}">
-                <a14:useLocalDpi xmlns:a14="http://schemas.microsoft.com/office/drawing/2010/main" val="0"/>
+                <a14:useLocalDpi xmlns:a14="http://schemas.microsoft.com/office/drawing/2010/main" xmlns="" val="0"/>
               </a:ext>
             </a:extLst>
           </a:blip>
@@ -16827,14 +16904,14 @@
           <a:effectLst/>
           <a:extLst>
             <a:ext uri="{909E8E84-426E-40DD-AFC4-6F175D3DCCD1}">
-              <a14:hiddenFill xmlns:a14="http://schemas.microsoft.com/office/drawing/2010/main">
+              <a14:hiddenFill xmlns:a14="http://schemas.microsoft.com/office/drawing/2010/main" xmlns="">
                 <a:solidFill>
                   <a:schemeClr val="accent1"/>
                 </a:solidFill>
               </a14:hiddenFill>
             </a:ext>
             <a:ext uri="{91240B29-F687-4F45-9708-019B960494DF}">
-              <a14:hiddenLine xmlns:a14="http://schemas.microsoft.com/office/drawing/2010/main" w="9525">
+              <a14:hiddenLine xmlns:a14="http://schemas.microsoft.com/office/drawing/2010/main" xmlns="" w="9525">
                 <a:solidFill>
                   <a:schemeClr val="tx1"/>
                 </a:solidFill>
@@ -16844,7 +16921,7 @@
               </a14:hiddenLine>
             </a:ext>
             <a:ext uri="{AF507438-7753-43E0-B8FC-AC1667EBCBE1}">
-              <a14:hiddenEffects xmlns:a14="http://schemas.microsoft.com/office/drawing/2010/main">
+              <a14:hiddenEffects xmlns:a14="http://schemas.microsoft.com/office/drawing/2010/main" xmlns="">
                 <a:effectLst>
                   <a:outerShdw dist="35921" dir="2700000" algn="ctr" rotWithShape="0">
                     <a:schemeClr val="bg2"/>
@@ -16877,14 +16954,14 @@
           </a:ln>
           <a:extLst>
             <a:ext uri="{909E8E84-426E-40DD-AFC4-6F175D3DCCD1}">
-              <a14:hiddenFill xmlns:a14="http://schemas.microsoft.com/office/drawing/2010/main">
+              <a14:hiddenFill xmlns:a14="http://schemas.microsoft.com/office/drawing/2010/main" xmlns="">
                 <a:solidFill>
                   <a:srgbClr val="FFFFFF"/>
                 </a:solidFill>
               </a14:hiddenFill>
             </a:ext>
             <a:ext uri="{91240B29-F687-4F45-9708-019B960494DF}">
-              <a14:hiddenLine xmlns:a14="http://schemas.microsoft.com/office/drawing/2010/main" w="9525">
+              <a14:hiddenLine xmlns:a14="http://schemas.microsoft.com/office/drawing/2010/main" xmlns="" w="9525">
                 <a:solidFill>
                   <a:srgbClr val="000000"/>
                 </a:solidFill>
@@ -17075,7 +17152,7 @@
           <a:blip r:embed="rId3" cstate="print">
             <a:extLst>
               <a:ext uri="{28A0092B-C50C-407E-A947-70E740481C1C}">
-                <a14:useLocalDpi xmlns:a14="http://schemas.microsoft.com/office/drawing/2010/main" val="0"/>
+                <a14:useLocalDpi xmlns:a14="http://schemas.microsoft.com/office/drawing/2010/main" xmlns="" val="0"/>
               </a:ext>
             </a:extLst>
           </a:blip>
@@ -17095,7 +17172,7 @@
           <a:noFill/>
           <a:extLst>
             <a:ext uri="{909E8E84-426E-40DD-AFC4-6F175D3DCCD1}">
-              <a14:hiddenFill xmlns:a14="http://schemas.microsoft.com/office/drawing/2010/main">
+              <a14:hiddenFill xmlns:a14="http://schemas.microsoft.com/office/drawing/2010/main" xmlns="">
                 <a:solidFill>
                   <a:srgbClr val="FFFFFF"/>
                 </a:solidFill>
@@ -17201,7 +17278,7 @@
     </p:spTree>
     <p:extLst>
       <p:ext uri="{BB962C8B-B14F-4D97-AF65-F5344CB8AC3E}">
-        <p14:creationId xmlns:p14="http://schemas.microsoft.com/office/powerpoint/2010/main" val="2490891038"/>
+        <p14:creationId xmlns:p14="http://schemas.microsoft.com/office/powerpoint/2010/main" xmlns="" val="2490891038"/>
       </p:ext>
     </p:extLst>
   </p:cSld>
@@ -17346,8 +17423,55 @@
                   </a:schemeClr>
                 </a:solidFill>
               </a:rPr>
-              <a:t>Approximately 8s capture + 12s download for 640x480</a:t>
-            </a:r>
+              <a:t>Approximately </a:t>
+            </a:r>
+            <a:r>
+              <a:rPr lang="en-GB" dirty="0" smtClean="0">
+                <a:solidFill>
+                  <a:schemeClr val="accent6">
+                    <a:lumMod val="75000"/>
+                  </a:schemeClr>
+                </a:solidFill>
+              </a:rPr>
+              <a:t>1 minute </a:t>
+            </a:r>
+            <a:r>
+              <a:rPr lang="en-GB" dirty="0" smtClean="0">
+                <a:solidFill>
+                  <a:schemeClr val="accent6">
+                    <a:lumMod val="75000"/>
+                  </a:schemeClr>
+                </a:solidFill>
+              </a:rPr>
+              <a:t>download for </a:t>
+            </a:r>
+            <a:r>
+              <a:rPr lang="en-GB" dirty="0" smtClean="0">
+                <a:solidFill>
+                  <a:schemeClr val="accent6">
+                    <a:lumMod val="75000"/>
+                  </a:schemeClr>
+                </a:solidFill>
+              </a:rPr>
+              <a:t>640x480</a:t>
+            </a:r>
+            <a:r>
+              <a:rPr lang="en-GB" dirty="0" smtClean="0">
+                <a:solidFill>
+                  <a:schemeClr val="accent6">
+                    <a:lumMod val="75000"/>
+                  </a:schemeClr>
+                </a:solidFill>
+              </a:rPr>
+              <a:t> (dependent on packet loss)</a:t>
+            </a:r>
+            <a:endParaRPr lang="en-GB" dirty="0" smtClean="0">
+              <a:solidFill>
+                <a:schemeClr val="accent6">
+                  <a:lumMod val="75000"/>
+                </a:schemeClr>
+              </a:solidFill>
+            </a:endParaRPr>
           </a:p>
         </p:txBody>
       </p:sp>
@@ -17363,7 +17487,7 @@
           <a:blip r:embed="rId3" cstate="print">
             <a:extLst>
               <a:ext uri="{28A0092B-C50C-407E-A947-70E740481C1C}">
-                <a14:useLocalDpi xmlns:a14="http://schemas.microsoft.com/office/drawing/2010/main" val="0"/>
+                <a14:useLocalDpi xmlns:a14="http://schemas.microsoft.com/office/drawing/2010/main" xmlns="" val="0"/>
               </a:ext>
             </a:extLst>
           </a:blip>
@@ -17383,7 +17507,7 @@
           <a:noFill/>
           <a:extLst>
             <a:ext uri="{909E8E84-426E-40DD-AFC4-6F175D3DCCD1}">
-              <a14:hiddenFill xmlns:a14="http://schemas.microsoft.com/office/drawing/2010/main">
+              <a14:hiddenFill xmlns:a14="http://schemas.microsoft.com/office/drawing/2010/main" xmlns="">
                 <a:solidFill>
                   <a:srgbClr val="FFFFFF"/>
                 </a:solidFill>
@@ -17404,7 +17528,7 @@
           <a:blip r:embed="rId3" cstate="print">
             <a:extLst>
               <a:ext uri="{28A0092B-C50C-407E-A947-70E740481C1C}">
-                <a14:useLocalDpi xmlns:a14="http://schemas.microsoft.com/office/drawing/2010/main" val="0"/>
+                <a14:useLocalDpi xmlns:a14="http://schemas.microsoft.com/office/drawing/2010/main" xmlns="" val="0"/>
               </a:ext>
             </a:extLst>
           </a:blip>
@@ -17424,7 +17548,7 @@
           <a:noFill/>
           <a:extLst>
             <a:ext uri="{909E8E84-426E-40DD-AFC4-6F175D3DCCD1}">
-              <a14:hiddenFill xmlns:a14="http://schemas.microsoft.com/office/drawing/2010/main">
+              <a14:hiddenFill xmlns:a14="http://schemas.microsoft.com/office/drawing/2010/main" xmlns="">
                 <a:solidFill>
                   <a:srgbClr val="FFFFFF"/>
                 </a:solidFill>
@@ -17436,7 +17560,7 @@
     </p:spTree>
     <p:extLst>
       <p:ext uri="{BB962C8B-B14F-4D97-AF65-F5344CB8AC3E}">
-        <p14:creationId xmlns:p14="http://schemas.microsoft.com/office/powerpoint/2010/main" val="111641515"/>
+        <p14:creationId xmlns:p14="http://schemas.microsoft.com/office/powerpoint/2010/main" xmlns="" val="111641515"/>
       </p:ext>
     </p:extLst>
   </p:cSld>

</xml_diff>